<commit_message>
added wyszukiwanie z wartownikiem
</commit_message>
<xml_diff>
--- a/Algorytm plecakowy.pptx
+++ b/Algorytm plecakowy.pptx
@@ -14,19 +14,24 @@
     <p:sldId id="272" r:id="rId9"/>
     <p:sldId id="271" r:id="rId10"/>
     <p:sldId id="273" r:id="rId11"/>
-    <p:sldId id="262" r:id="rId12"/>
-    <p:sldId id="276" r:id="rId13"/>
-    <p:sldId id="263" r:id="rId14"/>
-    <p:sldId id="265" r:id="rId15"/>
-    <p:sldId id="278" r:id="rId16"/>
-    <p:sldId id="266" r:id="rId17"/>
-    <p:sldId id="268" r:id="rId18"/>
-    <p:sldId id="270" r:id="rId19"/>
-    <p:sldId id="279" r:id="rId20"/>
-    <p:sldId id="264" r:id="rId21"/>
-    <p:sldId id="277" r:id="rId22"/>
-    <p:sldId id="291" r:id="rId23"/>
-    <p:sldId id="290" r:id="rId24"/>
+    <p:sldId id="276" r:id="rId12"/>
+    <p:sldId id="263" r:id="rId13"/>
+    <p:sldId id="265" r:id="rId14"/>
+    <p:sldId id="278" r:id="rId15"/>
+    <p:sldId id="266" r:id="rId16"/>
+    <p:sldId id="268" r:id="rId17"/>
+    <p:sldId id="270" r:id="rId18"/>
+    <p:sldId id="279" r:id="rId19"/>
+    <p:sldId id="264" r:id="rId20"/>
+    <p:sldId id="277" r:id="rId21"/>
+    <p:sldId id="291" r:id="rId22"/>
+    <p:sldId id="293" r:id="rId23"/>
+    <p:sldId id="294" r:id="rId24"/>
+    <p:sldId id="295" r:id="rId25"/>
+    <p:sldId id="296" r:id="rId26"/>
+    <p:sldId id="298" r:id="rId27"/>
+    <p:sldId id="297" r:id="rId28"/>
+    <p:sldId id="290" r:id="rId29"/>
   </p:sldIdLst>
   <p:sldSz cx="12192000" cy="6858000"/>
   <p:notesSz cx="6858000" cy="9144000"/>
@@ -3331,7 +3336,7 @@
       <p:grpSpPr/>
       <p:sp>
         <p:nvSpPr>
-          <p:cNvPr id="5" name="Title 4"/>
+          <p:cNvPr id="2" name="Title 1"/>
           <p:cNvSpPr>
             <a:spLocks noGrp="1"/>
           </p:cNvSpPr>
@@ -3360,9 +3365,9 @@
                 <a:effectLst/>
                 <a:sym typeface="+mn-ea"/>
               </a:rPr>
-              <a:t>metoda rekurencyjna(udoskonalona)- nieoptymalna</a:t>
-            </a:r>
-            <a:endParaRPr lang="en-US">
+              <a:t>Problem Plecakowy- programowanie zachłanne</a:t>
+            </a:r>
+            <a:endParaRPr lang="pl-PL" altLang="en-US">
               <a:ln w="22225">
                 <a:solidFill>
                   <a:schemeClr val="accent2"/>
@@ -3410,8 +3415,79 @@
         </p:nvSpPr>
         <p:spPr/>
         <p:txBody>
-          <a:bodyPr/>
-          <a:p>
+          <a:bodyPr>
+            <a:normAutofit fontScale="90000"/>
+          </a:bodyPr>
+          <a:p>
+            <a:r>
+              <a:rPr lang="pl-PL" altLang="en-US"/>
+              <a:t>Problem Plecakowy- programowanie zachłanne</a:t>
+            </a:r>
+            <a:endParaRPr lang="pl-PL" altLang="en-US"/>
+          </a:p>
+        </p:txBody>
+      </p:sp>
+      <p:sp>
+        <p:nvSpPr>
+          <p:cNvPr id="3" name="Content Placeholder 2"/>
+          <p:cNvSpPr>
+            <a:spLocks noGrp="1"/>
+          </p:cNvSpPr>
+          <p:nvPr>
+            <p:ph idx="1"/>
+          </p:nvPr>
+        </p:nvSpPr>
+        <p:spPr/>
+        <p:txBody>
+          <a:bodyPr>
+            <a:normAutofit lnSpcReduction="10000"/>
+          </a:bodyPr>
+          <a:p>
+            <a:r>
+              <a:rPr lang="pl-PL" altLang="en-US">
+                <a:solidFill>
+                  <a:schemeClr val="accent4"/>
+                </a:solidFill>
+              </a:rPr>
+              <a:t>Jest to najbardziej intuicyjny algorytm.</a:t>
+            </a:r>
+            <a:endParaRPr lang="pl-PL" altLang="en-US">
+              <a:solidFill>
+                <a:schemeClr val="accent4"/>
+              </a:solidFill>
+            </a:endParaRPr>
+          </a:p>
+          <a:p>
+            <a:endParaRPr lang="pl-PL" altLang="en-US">
+              <a:solidFill>
+                <a:schemeClr val="accent4"/>
+              </a:solidFill>
+            </a:endParaRPr>
+          </a:p>
+          <a:p>
+            <a:pPr algn="ctr"/>
+            <a:r>
+              <a:rPr lang="pl-PL" altLang="en-US">
+                <a:solidFill>
+                  <a:schemeClr val="accent4"/>
+                </a:solidFill>
+              </a:rPr>
+              <a:t>Zawsze wybieramy ten przedmiot który ma największy współczynnik proporcji między wartością a wagą, czyli nadajemy każdemu przedmiotowi liczbę z następującego wzoru:</a:t>
+            </a:r>
+            <a:br>
+              <a:rPr lang="pl-PL" altLang="en-US">
+                <a:solidFill>
+                  <a:schemeClr val="accent4"/>
+                </a:solidFill>
+              </a:rPr>
+            </a:br>
+            <a:br>
+              <a:rPr lang="pl-PL" altLang="en-US">
+                <a:solidFill>
+                  <a:schemeClr val="accent4"/>
+                </a:solidFill>
+              </a:rPr>
+            </a:br>
             <a:r>
               <a:rPr lang="pl-PL" altLang="en-US">
                 <a:ln w="22225">
@@ -3427,9 +3503,8 @@
                   </a:schemeClr>
                 </a:solidFill>
                 <a:effectLst/>
-                <a:sym typeface="+mn-ea"/>
               </a:rPr>
-              <a:t>Problem Plecakowy- programowanie zachłanne</a:t>
+              <a:t>współczynnik = wartość / waga</a:t>
             </a:r>
             <a:endParaRPr lang="pl-PL" altLang="en-US">
               <a:ln w="22225">
@@ -3445,6 +3520,38 @@
                 </a:schemeClr>
               </a:solidFill>
               <a:effectLst/>
+            </a:endParaRPr>
+          </a:p>
+          <a:p>
+            <a:endParaRPr lang="pl-PL" altLang="en-US">
+              <a:ln w="22225">
+                <a:solidFill>
+                  <a:schemeClr val="accent2"/>
+                </a:solidFill>
+                <a:prstDash val="solid"/>
+              </a:ln>
+              <a:solidFill>
+                <a:schemeClr val="accent2">
+                  <a:lumMod val="40000"/>
+                  <a:lumOff val="60000"/>
+                </a:schemeClr>
+              </a:solidFill>
+              <a:effectLst/>
+            </a:endParaRPr>
+          </a:p>
+          <a:p>
+            <a:r>
+              <a:rPr lang="pl-PL" altLang="en-US">
+                <a:solidFill>
+                  <a:schemeClr val="accent4"/>
+                </a:solidFill>
+              </a:rPr>
+              <a:t>Ze wzoru wynika, że im większa wartość przedmiotu i mniejsza waga tym jest on atrakcyjniejszy dla złodzieja.</a:t>
+            </a:r>
+            <a:endParaRPr lang="pl-PL" altLang="en-US">
+              <a:solidFill>
+                <a:schemeClr val="accent4"/>
+              </a:solidFill>
             </a:endParaRPr>
           </a:p>
         </p:txBody>
@@ -3484,10 +3591,12 @@
           </a:bodyPr>
           <a:p>
             <a:r>
-              <a:rPr lang="pl-PL" altLang="en-US"/>
+              <a:rPr lang="pl-PL" altLang="en-US">
+                <a:sym typeface="+mn-ea"/>
+              </a:rPr>
               <a:t>Problem Plecakowy- programowanie zachłanne</a:t>
             </a:r>
-            <a:endParaRPr lang="pl-PL" altLang="en-US"/>
+            <a:endParaRPr lang="en-US"/>
           </a:p>
         </p:txBody>
       </p:sp>
@@ -3503,55 +3612,59 @@
         </p:nvSpPr>
         <p:spPr/>
         <p:txBody>
-          <a:bodyPr>
-            <a:normAutofit lnSpcReduction="10000"/>
-          </a:bodyPr>
-          <a:p>
-            <a:r>
-              <a:rPr lang="pl-PL" altLang="en-US">
-                <a:solidFill>
-                  <a:schemeClr val="accent4"/>
-                </a:solidFill>
-              </a:rPr>
-              <a:t>Jest to najbardziej intuicyjny algorytm.</a:t>
-            </a:r>
-            <a:endParaRPr lang="pl-PL" altLang="en-US">
-              <a:solidFill>
-                <a:schemeClr val="accent4"/>
-              </a:solidFill>
-            </a:endParaRPr>
-          </a:p>
-          <a:p>
-            <a:endParaRPr lang="pl-PL" altLang="en-US">
-              <a:solidFill>
-                <a:schemeClr val="accent4"/>
-              </a:solidFill>
-            </a:endParaRPr>
-          </a:p>
-          <a:p>
-            <a:pPr algn="ctr"/>
-            <a:r>
-              <a:rPr lang="pl-PL" altLang="en-US">
-                <a:solidFill>
-                  <a:schemeClr val="accent4"/>
-                </a:solidFill>
-              </a:rPr>
-              <a:t>Zawsze wybieramy ten przedmiot który ma największy współczynnik proporcji między wartością a wagą, czyli nadajemy każdemu przedmiotowi liczbę z następującego wzoru:</a:t>
+          <a:bodyPr/>
+          <a:p>
+            <a:r>
+              <a:rPr lang="pl-PL" altLang="en-US"/>
+              <a:t>Każdemu przedmiotowi przypisujemy współczynnik</a:t>
             </a:r>
             <a:br>
-              <a:rPr lang="pl-PL" altLang="en-US">
-                <a:solidFill>
-                  <a:schemeClr val="accent4"/>
-                </a:solidFill>
-              </a:rPr>
+              <a:rPr lang="pl-PL" altLang="en-US"/>
             </a:br>
             <a:br>
-              <a:rPr lang="pl-PL" altLang="en-US">
-                <a:solidFill>
-                  <a:schemeClr val="accent4"/>
-                </a:solidFill>
-              </a:rPr>
+              <a:rPr lang="pl-PL" altLang="en-US"/>
             </a:br>
+            <a:r>
+              <a:rPr lang="pl-PL" altLang="en-US"/>
+              <a:t>Następnie sortujemy obliczone współczynniki od największej do najmniejszej. Po posortowaniu wybieramy najcenniejszy przedmiot tyle razy ile zmieści się do plecaka. Po tym zabiegu wybieramy coraz mniej wartościowe przedmioty pod warunkiem, że mieszczą się w plecaku.</a:t>
+            </a:r>
+            <a:endParaRPr lang="pl-PL" altLang="en-US"/>
+          </a:p>
+        </p:txBody>
+      </p:sp>
+    </p:spTree>
+  </p:cSld>
+  <p:clrMapOvr>
+    <a:masterClrMapping/>
+  </p:clrMapOvr>
+</p:sld>
+</file>
+
+<file path=ppt/slides/slide13.xml><?xml version="1.0" encoding="utf-8"?>
+<p:sld xmlns:a="http://schemas.openxmlformats.org/drawingml/2006/main" xmlns:r="http://schemas.openxmlformats.org/officeDocument/2006/relationships" xmlns:p="http://schemas.openxmlformats.org/presentationml/2006/main">
+  <p:cSld>
+    <p:spTree>
+      <p:nvGrpSpPr>
+        <p:cNvPr id="1" name=""/>
+        <p:cNvGrpSpPr/>
+        <p:nvPr/>
+      </p:nvGrpSpPr>
+      <p:grpSpPr/>
+      <p:sp>
+        <p:nvSpPr>
+          <p:cNvPr id="4" name="Title 3"/>
+          <p:cNvSpPr>
+            <a:spLocks noGrp="1"/>
+          </p:cNvSpPr>
+          <p:nvPr>
+            <p:ph type="title"/>
+          </p:nvPr>
+        </p:nvSpPr>
+        <p:spPr/>
+        <p:txBody>
+          <a:bodyPr/>
+          <a:p>
+            <a:pPr algn="l"/>
             <a:r>
               <a:rPr lang="pl-PL" altLang="en-US">
                 <a:ln w="22225">
@@ -3568,7 +3681,7 @@
                 </a:solidFill>
                 <a:effectLst/>
               </a:rPr>
-              <a:t>współczynnik = wartość / waga</a:t>
+              <a:t>Przykład</a:t>
             </a:r>
             <a:endParaRPr lang="pl-PL" altLang="en-US">
               <a:ln w="22225">
@@ -3586,37 +3699,27 @@
               <a:effectLst/>
             </a:endParaRPr>
           </a:p>
-          <a:p>
-            <a:endParaRPr lang="pl-PL" altLang="en-US">
-              <a:ln w="22225">
-                <a:solidFill>
-                  <a:schemeClr val="accent2"/>
-                </a:solidFill>
-                <a:prstDash val="solid"/>
-              </a:ln>
-              <a:solidFill>
-                <a:schemeClr val="accent2">
-                  <a:lumMod val="40000"/>
-                  <a:lumOff val="60000"/>
-                </a:schemeClr>
-              </a:solidFill>
-              <a:effectLst/>
-            </a:endParaRPr>
-          </a:p>
-          <a:p>
-            <a:r>
-              <a:rPr lang="pl-PL" altLang="en-US">
-                <a:solidFill>
-                  <a:schemeClr val="accent4"/>
-                </a:solidFill>
-              </a:rPr>
-              <a:t>Ze wzoru wynika, że im większa wartość przedmiotu i mniejsza waga tym jest on atrakcyjniejszy dla złodzieja.</a:t>
-            </a:r>
-            <a:endParaRPr lang="pl-PL" altLang="en-US">
-              <a:solidFill>
-                <a:schemeClr val="accent4"/>
-              </a:solidFill>
-            </a:endParaRPr>
+        </p:txBody>
+      </p:sp>
+      <p:sp>
+        <p:nvSpPr>
+          <p:cNvPr id="5" name="Text Placeholder 4"/>
+          <p:cNvSpPr>
+            <a:spLocks noGrp="1"/>
+          </p:cNvSpPr>
+          <p:nvPr>
+            <p:ph type="body" idx="1"/>
+          </p:nvPr>
+        </p:nvSpPr>
+        <p:spPr/>
+        <p:txBody>
+          <a:bodyPr/>
+          <a:p>
+            <a:r>
+              <a:rPr lang="pl-PL" altLang="en-US"/>
+              <a:t>Dla pojemności plekaka W= 20 kg</a:t>
+            </a:r>
+            <a:endParaRPr lang="pl-PL" altLang="en-US"/>
           </a:p>
         </p:txBody>
       </p:sp>
@@ -3628,7 +3731,7 @@
 </p:sld>
 </file>
 
-<file path=ppt/slides/slide13.xml><?xml version="1.0" encoding="utf-8"?>
+<file path=ppt/slides/slide14.xml><?xml version="1.0" encoding="utf-8"?>
 <p:sld xmlns:a="http://schemas.openxmlformats.org/drawingml/2006/main" xmlns:r="http://schemas.openxmlformats.org/officeDocument/2006/relationships" xmlns:p="http://schemas.openxmlformats.org/presentationml/2006/main">
   <p:cSld>
     <p:spTree>
@@ -3654,83 +3757,885 @@
             <a:normAutofit fontScale="90000"/>
           </a:bodyPr>
           <a:p>
-            <a:r>
-              <a:rPr lang="pl-PL" altLang="en-US">
-                <a:sym typeface="+mn-ea"/>
-              </a:rPr>
-              <a:t>Problem Plecakowy- programowanie zachłanne</a:t>
-            </a:r>
-            <a:endParaRPr lang="en-US"/>
+            <a:pPr algn="ctr"/>
+            <a:r>
+              <a:rPr lang="pl-PL"/>
+              <a:t>Przykład</a:t>
+            </a:r>
+            <a:endParaRPr lang="pl-PL"/>
           </a:p>
         </p:txBody>
       </p:sp>
-      <p:sp>
-        <p:nvSpPr>
-          <p:cNvPr id="3" name="Content Placeholder 2"/>
-          <p:cNvSpPr>
-            <a:spLocks noGrp="1"/>
-          </p:cNvSpPr>
+      <p:graphicFrame>
+        <p:nvGraphicFramePr>
+          <p:cNvPr id="4" name="Content Placeholder 3"/>
+          <p:cNvGraphicFramePr/>
           <p:nvPr>
             <p:ph idx="1"/>
           </p:nvPr>
-        </p:nvSpPr>
-        <p:spPr/>
-        <p:txBody>
-          <a:bodyPr/>
-          <a:p>
-            <a:r>
-              <a:rPr lang="pl-PL" altLang="en-US"/>
-              <a:t>Każdemu przedmiotowi przypisujemy współczynnik</a:t>
-            </a:r>
-            <a:br>
-              <a:rPr lang="pl-PL" altLang="en-US"/>
-            </a:br>
-            <a:br>
-              <a:rPr lang="pl-PL" altLang="en-US"/>
-            </a:br>
-            <a:r>
-              <a:rPr lang="pl-PL" altLang="en-US"/>
-              <a:t>Następnie sortujemy obliczone współczynniki od największej do najmniejszej. Po posortowaniu wybieramy najcenniejszy przedmiot tyle razy ile zmieści się do plecaka. Po tym zabiegu wybieramy coraz mniej wartościowe przedmioty pod warunkiem, że mieszczą się w plecaku.</a:t>
-            </a:r>
-            <a:endParaRPr lang="pl-PL" altLang="en-US"/>
-          </a:p>
-        </p:txBody>
-      </p:sp>
-    </p:spTree>
-  </p:cSld>
-  <p:clrMapOvr>
-    <a:masterClrMapping/>
-  </p:clrMapOvr>
-</p:sld>
-</file>
-
-<file path=ppt/slides/slide14.xml><?xml version="1.0" encoding="utf-8"?>
-<p:sld xmlns:a="http://schemas.openxmlformats.org/drawingml/2006/main" xmlns:r="http://schemas.openxmlformats.org/officeDocument/2006/relationships" xmlns:p="http://schemas.openxmlformats.org/presentationml/2006/main">
-  <p:cSld>
-    <p:spTree>
-      <p:nvGrpSpPr>
-        <p:cNvPr id="1" name=""/>
-        <p:cNvGrpSpPr/>
-        <p:nvPr/>
-      </p:nvGrpSpPr>
-      <p:grpSpPr/>
+        </p:nvGraphicFramePr>
+        <p:xfrm>
+          <a:off x="838200" y="1974850"/>
+          <a:ext cx="10515600" cy="1225550"/>
+        </p:xfrm>
+        <a:graphic>
+          <a:graphicData uri="http://schemas.openxmlformats.org/drawingml/2006/table">
+            <a:tbl>
+              <a:tblPr firstRow="1" bandRow="1">
+                <a:tableStyleId>{5C22544A-7EE6-4342-B048-85BDC9FD1C3A}</a:tableStyleId>
+              </a:tblPr>
+              <a:tblGrid>
+                <a:gridCol w="2103120"/>
+                <a:gridCol w="2103120"/>
+                <a:gridCol w="2103120"/>
+                <a:gridCol w="2103120"/>
+                <a:gridCol w="2103120"/>
+              </a:tblGrid>
+              <a:tr h="397510">
+                <a:tc>
+                  <a:txBody>
+                    <a:bodyPr/>
+                    <a:p>
+                      <a:pPr algn="ctr">
+                        <a:buNone/>
+                      </a:pPr>
+                      <a:r>
+                        <a:rPr lang="pl-PL" altLang="en-US"/>
+                        <a:t>Waga [kg]</a:t>
+                      </a:r>
+                      <a:endParaRPr lang="pl-PL" altLang="en-US"/>
+                    </a:p>
+                  </a:txBody>
+                  <a:tcPr anchor="ctr" anchorCtr="0">
+                    <a:solidFill>
+                      <a:schemeClr val="accent1">
+                        <a:lumMod val="60000"/>
+                        <a:lumOff val="40000"/>
+                      </a:schemeClr>
+                    </a:solidFill>
+                  </a:tcPr>
+                </a:tc>
+                <a:tc>
+                  <a:txBody>
+                    <a:bodyPr/>
+                    <a:p>
+                      <a:pPr algn="ctr">
+                        <a:buNone/>
+                      </a:pPr>
+                      <a:r>
+                        <a:rPr lang="pl-PL" altLang="en-US"/>
+                        <a:t>3</a:t>
+                      </a:r>
+                      <a:endParaRPr lang="pl-PL" altLang="en-US"/>
+                    </a:p>
+                  </a:txBody>
+                  <a:tcPr anchor="ctr" anchorCtr="0">
+                    <a:solidFill>
+                      <a:schemeClr val="accent2"/>
+                    </a:solidFill>
+                  </a:tcPr>
+                </a:tc>
+                <a:tc>
+                  <a:txBody>
+                    <a:bodyPr/>
+                    <a:p>
+                      <a:pPr algn="ctr">
+                        <a:buNone/>
+                      </a:pPr>
+                      <a:r>
+                        <a:rPr lang="pl-PL" altLang="en-US"/>
+                        <a:t>7</a:t>
+                      </a:r>
+                      <a:endParaRPr lang="pl-PL" altLang="en-US"/>
+                    </a:p>
+                  </a:txBody>
+                  <a:tcPr anchor="ctr" anchorCtr="0">
+                    <a:solidFill>
+                      <a:schemeClr val="accent2"/>
+                    </a:solidFill>
+                  </a:tcPr>
+                </a:tc>
+                <a:tc>
+                  <a:txBody>
+                    <a:bodyPr/>
+                    <a:p>
+                      <a:pPr algn="ctr">
+                        <a:buNone/>
+                      </a:pPr>
+                      <a:r>
+                        <a:rPr lang="pl-PL" altLang="en-US"/>
+                        <a:t>4</a:t>
+                      </a:r>
+                      <a:endParaRPr lang="pl-PL" altLang="en-US"/>
+                    </a:p>
+                  </a:txBody>
+                  <a:tcPr anchor="ctr" anchorCtr="0">
+                    <a:solidFill>
+                      <a:schemeClr val="accent2"/>
+                    </a:solidFill>
+                  </a:tcPr>
+                </a:tc>
+                <a:tc>
+                  <a:txBody>
+                    <a:bodyPr/>
+                    <a:p>
+                      <a:pPr algn="ctr">
+                        <a:buNone/>
+                      </a:pPr>
+                      <a:r>
+                        <a:rPr lang="pl-PL" altLang="en-US"/>
+                        <a:t>2</a:t>
+                      </a:r>
+                      <a:endParaRPr lang="pl-PL" altLang="en-US"/>
+                    </a:p>
+                  </a:txBody>
+                  <a:tcPr anchor="ctr" anchorCtr="0">
+                    <a:solidFill>
+                      <a:schemeClr val="accent2"/>
+                    </a:solidFill>
+                  </a:tcPr>
+                </a:tc>
+              </a:tr>
+              <a:tr h="397510">
+                <a:tc>
+                  <a:txBody>
+                    <a:bodyPr/>
+                    <a:p>
+                      <a:pPr algn="ctr">
+                        <a:buNone/>
+                      </a:pPr>
+                      <a:r>
+                        <a:rPr lang="pl-PL" altLang="en-US" b="1">
+                          <a:solidFill>
+                            <a:schemeClr val="bg1"/>
+                          </a:solidFill>
+                        </a:rPr>
+                        <a:t>Wartość [zł]</a:t>
+                      </a:r>
+                      <a:endParaRPr lang="pl-PL" altLang="en-US" b="1">
+                        <a:solidFill>
+                          <a:schemeClr val="bg1"/>
+                        </a:solidFill>
+                      </a:endParaRPr>
+                    </a:p>
+                  </a:txBody>
+                  <a:tcPr anchor="ctr" anchorCtr="0">
+                    <a:solidFill>
+                      <a:schemeClr val="accent1">
+                        <a:lumMod val="60000"/>
+                        <a:lumOff val="40000"/>
+                      </a:schemeClr>
+                    </a:solidFill>
+                  </a:tcPr>
+                </a:tc>
+                <a:tc>
+                  <a:txBody>
+                    <a:bodyPr/>
+                    <a:p>
+                      <a:pPr algn="ctr">
+                        <a:buNone/>
+                      </a:pPr>
+                      <a:r>
+                        <a:rPr lang="pl-PL" altLang="en-US" b="1">
+                          <a:solidFill>
+                            <a:schemeClr val="bg1"/>
+                          </a:solidFill>
+                        </a:rPr>
+                        <a:t>2</a:t>
+                      </a:r>
+                      <a:endParaRPr lang="pl-PL" altLang="en-US" b="1">
+                        <a:solidFill>
+                          <a:schemeClr val="bg1"/>
+                        </a:solidFill>
+                      </a:endParaRPr>
+                    </a:p>
+                  </a:txBody>
+                  <a:tcPr anchor="ctr" anchorCtr="0">
+                    <a:solidFill>
+                      <a:schemeClr val="accent2"/>
+                    </a:solidFill>
+                  </a:tcPr>
+                </a:tc>
+                <a:tc>
+                  <a:txBody>
+                    <a:bodyPr/>
+                    <a:p>
+                      <a:pPr algn="ctr">
+                        <a:buNone/>
+                      </a:pPr>
+                      <a:r>
+                        <a:rPr lang="pl-PL" altLang="en-US" b="1">
+                          <a:solidFill>
+                            <a:schemeClr val="bg1"/>
+                          </a:solidFill>
+                        </a:rPr>
+                        <a:t>7</a:t>
+                      </a:r>
+                      <a:endParaRPr lang="pl-PL" altLang="en-US" b="1">
+                        <a:solidFill>
+                          <a:schemeClr val="bg1"/>
+                        </a:solidFill>
+                      </a:endParaRPr>
+                    </a:p>
+                  </a:txBody>
+                  <a:tcPr anchor="ctr" anchorCtr="0">
+                    <a:solidFill>
+                      <a:schemeClr val="accent2"/>
+                    </a:solidFill>
+                  </a:tcPr>
+                </a:tc>
+                <a:tc>
+                  <a:txBody>
+                    <a:bodyPr/>
+                    <a:p>
+                      <a:pPr algn="ctr">
+                        <a:buNone/>
+                      </a:pPr>
+                      <a:r>
+                        <a:rPr lang="pl-PL" altLang="en-US" b="1">
+                          <a:solidFill>
+                            <a:schemeClr val="bg1"/>
+                          </a:solidFill>
+                        </a:rPr>
+                        <a:t>2</a:t>
+                      </a:r>
+                      <a:endParaRPr lang="pl-PL" altLang="en-US" b="1">
+                        <a:solidFill>
+                          <a:schemeClr val="bg1"/>
+                        </a:solidFill>
+                      </a:endParaRPr>
+                    </a:p>
+                  </a:txBody>
+                  <a:tcPr anchor="ctr" anchorCtr="0">
+                    <a:solidFill>
+                      <a:schemeClr val="accent2"/>
+                    </a:solidFill>
+                  </a:tcPr>
+                </a:tc>
+                <a:tc>
+                  <a:txBody>
+                    <a:bodyPr/>
+                    <a:p>
+                      <a:pPr algn="ctr">
+                        <a:buNone/>
+                      </a:pPr>
+                      <a:r>
+                        <a:rPr lang="pl-PL" altLang="en-US" b="1">
+                          <a:solidFill>
+                            <a:schemeClr val="bg1"/>
+                          </a:solidFill>
+                        </a:rPr>
+                        <a:t>1</a:t>
+                      </a:r>
+                      <a:endParaRPr lang="pl-PL" altLang="en-US" b="1">
+                        <a:solidFill>
+                          <a:schemeClr val="bg1"/>
+                        </a:solidFill>
+                      </a:endParaRPr>
+                    </a:p>
+                  </a:txBody>
+                  <a:tcPr anchor="ctr" anchorCtr="0">
+                    <a:solidFill>
+                      <a:schemeClr val="accent2"/>
+                    </a:solidFill>
+                  </a:tcPr>
+                </a:tc>
+              </a:tr>
+              <a:tr h="430530">
+                <a:tc>
+                  <a:txBody>
+                    <a:bodyPr/>
+                    <a:p>
+                      <a:pPr algn="ctr">
+                        <a:buNone/>
+                      </a:pPr>
+                      <a:r>
+                        <a:rPr lang="pl-PL" altLang="en-US" b="1">
+                          <a:solidFill>
+                            <a:schemeClr val="bg1"/>
+                          </a:solidFill>
+                        </a:rPr>
+                        <a:t>Współczynnik</a:t>
+                      </a:r>
+                      <a:endParaRPr lang="pl-PL" altLang="en-US" b="1">
+                        <a:solidFill>
+                          <a:schemeClr val="bg1"/>
+                        </a:solidFill>
+                      </a:endParaRPr>
+                    </a:p>
+                  </a:txBody>
+                  <a:tcPr anchor="ctr" anchorCtr="0">
+                    <a:solidFill>
+                      <a:schemeClr val="accent1">
+                        <a:lumMod val="60000"/>
+                        <a:lumOff val="40000"/>
+                      </a:schemeClr>
+                    </a:solidFill>
+                  </a:tcPr>
+                </a:tc>
+                <a:tc>
+                  <a:txBody>
+                    <a:bodyPr/>
+                    <a:p>
+                      <a:pPr algn="ctr">
+                        <a:buNone/>
+                      </a:pPr>
+                      <a:r>
+                        <a:rPr lang="pl-PL" altLang="en-US" b="1">
+                          <a:solidFill>
+                            <a:schemeClr val="bg1"/>
+                          </a:solidFill>
+                        </a:rPr>
+                        <a:t>0.667</a:t>
+                      </a:r>
+                      <a:endParaRPr lang="pl-PL" altLang="en-US" b="1">
+                        <a:solidFill>
+                          <a:schemeClr val="bg1"/>
+                        </a:solidFill>
+                      </a:endParaRPr>
+                    </a:p>
+                  </a:txBody>
+                  <a:tcPr anchor="ctr" anchorCtr="0">
+                    <a:solidFill>
+                      <a:schemeClr val="accent1"/>
+                    </a:solidFill>
+                  </a:tcPr>
+                </a:tc>
+                <a:tc>
+                  <a:txBody>
+                    <a:bodyPr/>
+                    <a:p>
+                      <a:pPr algn="ctr">
+                        <a:buNone/>
+                      </a:pPr>
+                      <a:r>
+                        <a:rPr lang="pl-PL" altLang="en-US" b="1">
+                          <a:solidFill>
+                            <a:schemeClr val="bg1"/>
+                          </a:solidFill>
+                        </a:rPr>
+                        <a:t>1</a:t>
+                      </a:r>
+                      <a:endParaRPr lang="pl-PL" altLang="en-US" b="1">
+                        <a:solidFill>
+                          <a:schemeClr val="bg1"/>
+                        </a:solidFill>
+                      </a:endParaRPr>
+                    </a:p>
+                  </a:txBody>
+                  <a:tcPr anchor="ctr" anchorCtr="0">
+                    <a:solidFill>
+                      <a:schemeClr val="accent1"/>
+                    </a:solidFill>
+                  </a:tcPr>
+                </a:tc>
+                <a:tc>
+                  <a:txBody>
+                    <a:bodyPr/>
+                    <a:p>
+                      <a:pPr algn="ctr">
+                        <a:buNone/>
+                      </a:pPr>
+                      <a:r>
+                        <a:rPr lang="pl-PL" altLang="en-US" b="1">
+                          <a:solidFill>
+                            <a:schemeClr val="bg1"/>
+                          </a:solidFill>
+                        </a:rPr>
+                        <a:t>0.5</a:t>
+                      </a:r>
+                      <a:endParaRPr lang="pl-PL" altLang="en-US" b="1">
+                        <a:solidFill>
+                          <a:schemeClr val="bg1"/>
+                        </a:solidFill>
+                      </a:endParaRPr>
+                    </a:p>
+                  </a:txBody>
+                  <a:tcPr anchor="ctr" anchorCtr="0">
+                    <a:solidFill>
+                      <a:schemeClr val="accent1"/>
+                    </a:solidFill>
+                  </a:tcPr>
+                </a:tc>
+                <a:tc>
+                  <a:txBody>
+                    <a:bodyPr/>
+                    <a:p>
+                      <a:pPr algn="ctr">
+                        <a:buNone/>
+                      </a:pPr>
+                      <a:r>
+                        <a:rPr lang="pl-PL" altLang="en-US" b="1">
+                          <a:solidFill>
+                            <a:schemeClr val="bg1"/>
+                          </a:solidFill>
+                        </a:rPr>
+                        <a:t>0.5</a:t>
+                      </a:r>
+                      <a:endParaRPr lang="pl-PL" altLang="en-US" b="1">
+                        <a:solidFill>
+                          <a:schemeClr val="bg1"/>
+                        </a:solidFill>
+                      </a:endParaRPr>
+                    </a:p>
+                  </a:txBody>
+                  <a:tcPr anchor="ctr" anchorCtr="0">
+                    <a:solidFill>
+                      <a:schemeClr val="accent1"/>
+                    </a:solidFill>
+                  </a:tcPr>
+                </a:tc>
+              </a:tr>
+            </a:tbl>
+          </a:graphicData>
+        </a:graphic>
+      </p:graphicFrame>
+      <p:graphicFrame>
+        <p:nvGraphicFramePr>
+          <p:cNvPr id="5" name="Table 4"/>
+          <p:cNvGraphicFramePr/>
+          <p:nvPr/>
+        </p:nvGraphicFramePr>
+        <p:xfrm>
+          <a:off x="838200" y="4043045"/>
+          <a:ext cx="10515600" cy="1925320"/>
+        </p:xfrm>
+        <a:graphic>
+          <a:graphicData uri="http://schemas.openxmlformats.org/drawingml/2006/table">
+            <a:tbl>
+              <a:tblPr firstRow="1" bandRow="1">
+                <a:tableStyleId>{5C22544A-7EE6-4342-B048-85BDC9FD1C3A}</a:tableStyleId>
+              </a:tblPr>
+              <a:tblGrid>
+                <a:gridCol w="2103120"/>
+                <a:gridCol w="2103120"/>
+                <a:gridCol w="2103120"/>
+                <a:gridCol w="2103120"/>
+                <a:gridCol w="2103120"/>
+              </a:tblGrid>
+              <a:tr h="709930">
+                <a:tc>
+                  <a:txBody>
+                    <a:bodyPr/>
+                    <a:p>
+                      <a:pPr algn="ctr">
+                        <a:buNone/>
+                      </a:pPr>
+                      <a:r>
+                        <a:rPr lang="pl-PL" altLang="en-US"/>
+                        <a:t>Waga [kg]</a:t>
+                      </a:r>
+                      <a:endParaRPr lang="pl-PL" altLang="en-US"/>
+                    </a:p>
+                  </a:txBody>
+                  <a:tcPr anchor="ctr" anchorCtr="0">
+                    <a:solidFill>
+                      <a:schemeClr val="accent1">
+                        <a:lumMod val="60000"/>
+                        <a:lumOff val="40000"/>
+                      </a:schemeClr>
+                    </a:solidFill>
+                  </a:tcPr>
+                </a:tc>
+                <a:tc>
+                  <a:txBody>
+                    <a:bodyPr/>
+                    <a:p>
+                      <a:pPr algn="ctr">
+                        <a:buNone/>
+                      </a:pPr>
+                      <a:r>
+                        <a:rPr lang="pl-PL" altLang="en-US"/>
+                        <a:t>7</a:t>
+                      </a:r>
+                      <a:endParaRPr lang="pl-PL" altLang="en-US"/>
+                    </a:p>
+                  </a:txBody>
+                  <a:tcPr anchor="ctr" anchorCtr="0">
+                    <a:solidFill>
+                      <a:schemeClr val="accent2"/>
+                    </a:solidFill>
+                  </a:tcPr>
+                </a:tc>
+                <a:tc>
+                  <a:txBody>
+                    <a:bodyPr/>
+                    <a:p>
+                      <a:pPr algn="ctr">
+                        <a:buNone/>
+                      </a:pPr>
+                      <a:r>
+                        <a:rPr lang="pl-PL" altLang="en-US"/>
+                        <a:t>3</a:t>
+                      </a:r>
+                      <a:endParaRPr lang="pl-PL" altLang="en-US"/>
+                    </a:p>
+                  </a:txBody>
+                  <a:tcPr anchor="ctr" anchorCtr="0">
+                    <a:solidFill>
+                      <a:schemeClr val="accent2"/>
+                    </a:solidFill>
+                  </a:tcPr>
+                </a:tc>
+                <a:tc>
+                  <a:txBody>
+                    <a:bodyPr/>
+                    <a:p>
+                      <a:pPr algn="ctr">
+                        <a:buNone/>
+                      </a:pPr>
+                      <a:r>
+                        <a:rPr lang="pl-PL" altLang="en-US"/>
+                        <a:t>4</a:t>
+                      </a:r>
+                      <a:endParaRPr lang="pl-PL" altLang="en-US"/>
+                    </a:p>
+                  </a:txBody>
+                  <a:tcPr anchor="ctr" anchorCtr="0">
+                    <a:solidFill>
+                      <a:schemeClr val="accent2"/>
+                    </a:solidFill>
+                  </a:tcPr>
+                </a:tc>
+                <a:tc>
+                  <a:txBody>
+                    <a:bodyPr/>
+                    <a:p>
+                      <a:pPr algn="ctr">
+                        <a:buNone/>
+                      </a:pPr>
+                      <a:r>
+                        <a:rPr lang="pl-PL" altLang="en-US"/>
+                        <a:t>2</a:t>
+                      </a:r>
+                      <a:endParaRPr lang="pl-PL" altLang="en-US"/>
+                    </a:p>
+                  </a:txBody>
+                  <a:tcPr anchor="ctr" anchorCtr="0">
+                    <a:solidFill>
+                      <a:schemeClr val="accent2"/>
+                    </a:solidFill>
+                  </a:tcPr>
+                </a:tc>
+              </a:tr>
+              <a:tr h="584200">
+                <a:tc>
+                  <a:txBody>
+                    <a:bodyPr/>
+                    <a:p>
+                      <a:pPr algn="ctr">
+                        <a:buNone/>
+                      </a:pPr>
+                      <a:r>
+                        <a:rPr lang="pl-PL" altLang="en-US" b="1">
+                          <a:solidFill>
+                            <a:schemeClr val="bg1"/>
+                          </a:solidFill>
+                        </a:rPr>
+                        <a:t>Wartość [zł]</a:t>
+                      </a:r>
+                      <a:endParaRPr lang="pl-PL" altLang="en-US" b="1">
+                        <a:solidFill>
+                          <a:schemeClr val="bg1"/>
+                        </a:solidFill>
+                      </a:endParaRPr>
+                    </a:p>
+                  </a:txBody>
+                  <a:tcPr anchor="ctr" anchorCtr="0">
+                    <a:solidFill>
+                      <a:schemeClr val="accent1">
+                        <a:lumMod val="60000"/>
+                        <a:lumOff val="40000"/>
+                      </a:schemeClr>
+                    </a:solidFill>
+                  </a:tcPr>
+                </a:tc>
+                <a:tc>
+                  <a:txBody>
+                    <a:bodyPr/>
+                    <a:p>
+                      <a:pPr algn="ctr">
+                        <a:buNone/>
+                      </a:pPr>
+                      <a:r>
+                        <a:rPr lang="pl-PL" altLang="en-US" b="1">
+                          <a:solidFill>
+                            <a:schemeClr val="bg1"/>
+                          </a:solidFill>
+                        </a:rPr>
+                        <a:t>7</a:t>
+                      </a:r>
+                      <a:endParaRPr lang="pl-PL" altLang="en-US" b="1">
+                        <a:solidFill>
+                          <a:schemeClr val="bg1"/>
+                        </a:solidFill>
+                      </a:endParaRPr>
+                    </a:p>
+                  </a:txBody>
+                  <a:tcPr anchor="ctr" anchorCtr="0">
+                    <a:solidFill>
+                      <a:schemeClr val="accent2"/>
+                    </a:solidFill>
+                  </a:tcPr>
+                </a:tc>
+                <a:tc>
+                  <a:txBody>
+                    <a:bodyPr/>
+                    <a:p>
+                      <a:pPr algn="ctr">
+                        <a:buNone/>
+                      </a:pPr>
+                      <a:r>
+                        <a:rPr lang="pl-PL" altLang="en-US" b="1">
+                          <a:solidFill>
+                            <a:schemeClr val="bg1"/>
+                          </a:solidFill>
+                        </a:rPr>
+                        <a:t>2</a:t>
+                      </a:r>
+                      <a:endParaRPr lang="pl-PL" altLang="en-US" b="1">
+                        <a:solidFill>
+                          <a:schemeClr val="bg1"/>
+                        </a:solidFill>
+                      </a:endParaRPr>
+                    </a:p>
+                  </a:txBody>
+                  <a:tcPr anchor="ctr" anchorCtr="0">
+                    <a:solidFill>
+                      <a:schemeClr val="accent2"/>
+                    </a:solidFill>
+                  </a:tcPr>
+                </a:tc>
+                <a:tc>
+                  <a:txBody>
+                    <a:bodyPr/>
+                    <a:p>
+                      <a:pPr algn="ctr">
+                        <a:buNone/>
+                      </a:pPr>
+                      <a:r>
+                        <a:rPr lang="pl-PL" altLang="en-US" b="1">
+                          <a:solidFill>
+                            <a:schemeClr val="bg1"/>
+                          </a:solidFill>
+                        </a:rPr>
+                        <a:t>2</a:t>
+                      </a:r>
+                      <a:endParaRPr lang="pl-PL" altLang="en-US" b="1">
+                        <a:solidFill>
+                          <a:schemeClr val="bg1"/>
+                        </a:solidFill>
+                      </a:endParaRPr>
+                    </a:p>
+                  </a:txBody>
+                  <a:tcPr anchor="ctr" anchorCtr="0">
+                    <a:solidFill>
+                      <a:schemeClr val="accent2"/>
+                    </a:solidFill>
+                  </a:tcPr>
+                </a:tc>
+                <a:tc>
+                  <a:txBody>
+                    <a:bodyPr/>
+                    <a:p>
+                      <a:pPr algn="ctr">
+                        <a:buNone/>
+                      </a:pPr>
+                      <a:r>
+                        <a:rPr lang="pl-PL" altLang="en-US" b="1">
+                          <a:solidFill>
+                            <a:schemeClr val="bg1"/>
+                          </a:solidFill>
+                        </a:rPr>
+                        <a:t>1</a:t>
+                      </a:r>
+                      <a:endParaRPr lang="pl-PL" altLang="en-US" b="1">
+                        <a:solidFill>
+                          <a:schemeClr val="bg1"/>
+                        </a:solidFill>
+                      </a:endParaRPr>
+                    </a:p>
+                  </a:txBody>
+                  <a:tcPr anchor="ctr" anchorCtr="0">
+                    <a:solidFill>
+                      <a:schemeClr val="accent2"/>
+                    </a:solidFill>
+                  </a:tcPr>
+                </a:tc>
+              </a:tr>
+              <a:tr h="631190">
+                <a:tc>
+                  <a:txBody>
+                    <a:bodyPr/>
+                    <a:p>
+                      <a:pPr algn="ctr">
+                        <a:buNone/>
+                      </a:pPr>
+                      <a:r>
+                        <a:rPr lang="pl-PL" altLang="en-US" b="1">
+                          <a:solidFill>
+                            <a:schemeClr val="bg1"/>
+                          </a:solidFill>
+                        </a:rPr>
+                        <a:t>Współczynnik</a:t>
+                      </a:r>
+                      <a:endParaRPr lang="pl-PL" altLang="en-US" b="1">
+                        <a:solidFill>
+                          <a:schemeClr val="bg1"/>
+                        </a:solidFill>
+                      </a:endParaRPr>
+                    </a:p>
+                  </a:txBody>
+                  <a:tcPr anchor="ctr" anchorCtr="0">
+                    <a:solidFill>
+                      <a:schemeClr val="accent1">
+                        <a:lumMod val="60000"/>
+                        <a:lumOff val="40000"/>
+                      </a:schemeClr>
+                    </a:solidFill>
+                  </a:tcPr>
+                </a:tc>
+                <a:tc>
+                  <a:txBody>
+                    <a:bodyPr/>
+                    <a:p>
+                      <a:pPr algn="ctr">
+                        <a:buNone/>
+                      </a:pPr>
+                      <a:r>
+                        <a:rPr lang="pl-PL" altLang="en-US" b="1">
+                          <a:solidFill>
+                            <a:schemeClr val="bg1"/>
+                          </a:solidFill>
+                        </a:rPr>
+                        <a:t>1</a:t>
+                      </a:r>
+                      <a:endParaRPr lang="pl-PL" altLang="en-US" b="1">
+                        <a:solidFill>
+                          <a:schemeClr val="bg1"/>
+                        </a:solidFill>
+                      </a:endParaRPr>
+                    </a:p>
+                  </a:txBody>
+                  <a:tcPr anchor="ctr" anchorCtr="0">
+                    <a:solidFill>
+                      <a:schemeClr val="accent1"/>
+                    </a:solidFill>
+                  </a:tcPr>
+                </a:tc>
+                <a:tc>
+                  <a:txBody>
+                    <a:bodyPr/>
+                    <a:p>
+                      <a:pPr algn="ctr">
+                        <a:buNone/>
+                      </a:pPr>
+                      <a:r>
+                        <a:rPr lang="pl-PL" altLang="en-US" b="1">
+                          <a:solidFill>
+                            <a:schemeClr val="bg1"/>
+                          </a:solidFill>
+                        </a:rPr>
+                        <a:t>0.667</a:t>
+                      </a:r>
+                      <a:endParaRPr lang="pl-PL" altLang="en-US" b="1">
+                        <a:solidFill>
+                          <a:schemeClr val="bg1"/>
+                        </a:solidFill>
+                      </a:endParaRPr>
+                    </a:p>
+                  </a:txBody>
+                  <a:tcPr anchor="ctr" anchorCtr="0">
+                    <a:solidFill>
+                      <a:schemeClr val="accent1"/>
+                    </a:solidFill>
+                  </a:tcPr>
+                </a:tc>
+                <a:tc>
+                  <a:txBody>
+                    <a:bodyPr/>
+                    <a:p>
+                      <a:pPr algn="ctr">
+                        <a:buNone/>
+                      </a:pPr>
+                      <a:r>
+                        <a:rPr lang="pl-PL" altLang="en-US" b="1">
+                          <a:solidFill>
+                            <a:schemeClr val="bg1"/>
+                          </a:solidFill>
+                        </a:rPr>
+                        <a:t>0.5</a:t>
+                      </a:r>
+                      <a:endParaRPr lang="pl-PL" altLang="en-US" b="1">
+                        <a:solidFill>
+                          <a:schemeClr val="bg1"/>
+                        </a:solidFill>
+                      </a:endParaRPr>
+                    </a:p>
+                  </a:txBody>
+                  <a:tcPr anchor="ctr" anchorCtr="0">
+                    <a:solidFill>
+                      <a:schemeClr val="accent1"/>
+                    </a:solidFill>
+                  </a:tcPr>
+                </a:tc>
+                <a:tc>
+                  <a:txBody>
+                    <a:bodyPr/>
+                    <a:p>
+                      <a:pPr algn="ctr">
+                        <a:buNone/>
+                      </a:pPr>
+                      <a:r>
+                        <a:rPr lang="pl-PL" altLang="en-US" b="1">
+                          <a:solidFill>
+                            <a:schemeClr val="bg1"/>
+                          </a:solidFill>
+                        </a:rPr>
+                        <a:t>0.5</a:t>
+                      </a:r>
+                      <a:endParaRPr lang="pl-PL" altLang="en-US" b="1">
+                        <a:solidFill>
+                          <a:schemeClr val="bg1"/>
+                        </a:solidFill>
+                      </a:endParaRPr>
+                    </a:p>
+                  </a:txBody>
+                  <a:tcPr anchor="ctr" anchorCtr="0">
+                    <a:solidFill>
+                      <a:schemeClr val="accent1"/>
+                    </a:solidFill>
+                  </a:tcPr>
+                </a:tc>
+              </a:tr>
+            </a:tbl>
+          </a:graphicData>
+        </a:graphic>
+      </p:graphicFrame>
       <p:sp>
         <p:nvSpPr>
-          <p:cNvPr id="4" name="Title 3"/>
-          <p:cNvSpPr>
-            <a:spLocks noGrp="1"/>
-          </p:cNvSpPr>
-          <p:nvPr>
-            <p:ph type="title"/>
-          </p:nvPr>
+          <p:cNvPr id="11" name="Text Box 10"/>
+          <p:cNvSpPr txBox="1"/>
+          <p:nvPr/>
         </p:nvSpPr>
-        <p:spPr/>
+        <p:spPr>
+          <a:xfrm>
+            <a:off x="3749040" y="1084580"/>
+            <a:ext cx="4693920" cy="579120"/>
+          </a:xfrm>
+          <a:prstGeom prst="rect">
+            <a:avLst/>
+          </a:prstGeom>
+          <a:noFill/>
+        </p:spPr>
         <p:txBody>
-          <a:bodyPr/>
-          <a:p>
-            <a:pPr algn="l"/>
-            <a:r>
-              <a:rPr lang="pl-PL" altLang="en-US">
+          <a:bodyPr wrap="square" rtlCol="0">
+            <a:spAutoFit/>
+          </a:bodyPr>
+          <a:p>
+            <a:pPr algn="ctr"/>
+            <a:r>
+              <a:rPr lang="pl-PL" altLang="en-US" sz="3200">
                 <a:ln w="22225">
                   <a:solidFill>
                     <a:schemeClr val="accent2"/>
@@ -3745,9 +4650,9 @@
                 </a:solidFill>
                 <a:effectLst/>
               </a:rPr>
-              <a:t>Przykład</a:t>
-            </a:r>
-            <a:endParaRPr lang="pl-PL" altLang="en-US">
+              <a:t>Sortowanie przedmiotów</a:t>
+            </a:r>
+            <a:endParaRPr lang="pl-PL" altLang="en-US" sz="3200">
               <a:ln w="22225">
                 <a:solidFill>
                   <a:schemeClr val="accent2"/>
@@ -3762,28 +4667,6 @@
               </a:solidFill>
               <a:effectLst/>
             </a:endParaRPr>
-          </a:p>
-        </p:txBody>
-      </p:sp>
-      <p:sp>
-        <p:nvSpPr>
-          <p:cNvPr id="5" name="Text Placeholder 4"/>
-          <p:cNvSpPr>
-            <a:spLocks noGrp="1"/>
-          </p:cNvSpPr>
-          <p:nvPr>
-            <p:ph type="body" idx="1"/>
-          </p:nvPr>
-        </p:nvSpPr>
-        <p:spPr/>
-        <p:txBody>
-          <a:bodyPr/>
-          <a:p>
-            <a:r>
-              <a:rPr lang="pl-PL" altLang="en-US"/>
-              <a:t>Dla pojemności plekaka W= 20 kg</a:t>
-            </a:r>
-            <a:endParaRPr lang="pl-PL" altLang="en-US"/>
           </a:p>
         </p:txBody>
       </p:sp>
@@ -3817,30 +4700,69 @@
         </p:nvSpPr>
         <p:spPr/>
         <p:txBody>
-          <a:bodyPr>
-            <a:normAutofit fontScale="90000"/>
-          </a:bodyPr>
+          <a:bodyPr/>
           <a:p>
             <a:pPr algn="ctr"/>
             <a:r>
-              <a:rPr lang="pl-PL"/>
+              <a:rPr lang="pl-PL" altLang="en-US"/>
               <a:t>Przykład</a:t>
             </a:r>
-            <a:endParaRPr lang="pl-PL"/>
+            <a:endParaRPr lang="pl-PL" altLang="en-US"/>
+          </a:p>
+        </p:txBody>
+      </p:sp>
+      <p:sp>
+        <p:nvSpPr>
+          <p:cNvPr id="3" name="Content Placeholder 2"/>
+          <p:cNvSpPr>
+            <a:spLocks noGrp="1"/>
+          </p:cNvSpPr>
+          <p:nvPr>
+            <p:ph sz="half" idx="1"/>
+          </p:nvPr>
+        </p:nvSpPr>
+        <p:spPr>
+          <a:xfrm>
+            <a:off x="1539240" y="3911600"/>
+            <a:ext cx="9895205" cy="2432050"/>
+          </a:xfrm>
+        </p:spPr>
+        <p:txBody>
+          <a:bodyPr/>
+          <a:p>
+            <a:r>
+              <a:rPr lang="pl-PL" altLang="en-US"/>
+              <a:t>Idąc od lewej strony:</a:t>
+            </a:r>
+            <a:endParaRPr lang="pl-PL" altLang="en-US"/>
+          </a:p>
+          <a:p>
+            <a:r>
+              <a:rPr lang="pl-PL" altLang="en-US"/>
+              <a:t>1) pakujemy 2 przedmioty o masie 7 ( w plecaku zostaje miejsce na 6 kg)</a:t>
+            </a:r>
+            <a:endParaRPr lang="pl-PL" altLang="en-US"/>
+          </a:p>
+          <a:p>
+            <a:r>
+              <a:rPr lang="pl-PL" altLang="en-US"/>
+              <a:t>2) pakujemy 2 przedmioty o masie 3 ( plecak pełny)</a:t>
+            </a:r>
+            <a:endParaRPr lang="pl-PL" altLang="en-US"/>
           </a:p>
         </p:txBody>
       </p:sp>
       <p:graphicFrame>
         <p:nvGraphicFramePr>
-          <p:cNvPr id="4" name="Content Placeholder 3"/>
+          <p:cNvPr id="6" name="Content Placeholder 5"/>
           <p:cNvGraphicFramePr/>
           <p:nvPr>
-            <p:ph idx="1"/>
+            <p:ph sz="half" idx="2"/>
           </p:nvPr>
         </p:nvGraphicFramePr>
         <p:xfrm>
-          <a:off x="838200" y="1974850"/>
-          <a:ext cx="10515600" cy="1225550"/>
+          <a:off x="1539240" y="1788160"/>
+          <a:ext cx="8651875" cy="1925320"/>
         </p:xfrm>
         <a:graphic>
           <a:graphicData uri="http://schemas.openxmlformats.org/drawingml/2006/table">
@@ -3849,13 +4771,13 @@
                 <a:tableStyleId>{5C22544A-7EE6-4342-B048-85BDC9FD1C3A}</a:tableStyleId>
               </a:tblPr>
               <a:tblGrid>
-                <a:gridCol w="2103120"/>
-                <a:gridCol w="2103120"/>
-                <a:gridCol w="2103120"/>
-                <a:gridCol w="2103120"/>
-                <a:gridCol w="2103120"/>
+                <a:gridCol w="1729740"/>
+                <a:gridCol w="1731010"/>
+                <a:gridCol w="1730375"/>
+                <a:gridCol w="1731010"/>
+                <a:gridCol w="1729740"/>
               </a:tblGrid>
-              <a:tr h="397510">
+              <a:tr h="709930">
                 <a:tc>
                   <a:txBody>
                     <a:bodyPr/>
@@ -3888,7 +4810,7 @@
                       </a:pPr>
                       <a:r>
                         <a:rPr lang="pl-PL" altLang="en-US"/>
-                        <a:t>3</a:t>
+                        <a:t>7</a:t>
                       </a:r>
                       <a:endParaRPr lang="pl-PL" altLang="en-US"/>
                     </a:p>
@@ -3908,7 +4830,7 @@
                       </a:pPr>
                       <a:r>
                         <a:rPr lang="pl-PL" altLang="en-US"/>
-                        <a:t>7</a:t>
+                        <a:t>3</a:t>
                       </a:r>
                       <a:endParaRPr lang="pl-PL" altLang="en-US"/>
                     </a:p>
@@ -3960,7 +4882,7 @@
                   </a:tcPr>
                 </a:tc>
               </a:tr>
-              <a:tr h="397510">
+              <a:tr h="584200">
                 <a:tc>
                   <a:txBody>
                     <a:bodyPr/>
@@ -4005,34 +4927,6 @@
                             <a:schemeClr val="bg1"/>
                           </a:solidFill>
                         </a:rPr>
-                        <a:t>2</a:t>
-                      </a:r>
-                      <a:endParaRPr lang="pl-PL" altLang="en-US" b="1">
-                        <a:solidFill>
-                          <a:schemeClr val="bg1"/>
-                        </a:solidFill>
-                      </a:endParaRPr>
-                    </a:p>
-                  </a:txBody>
-                  <a:tcPr anchor="ctr" anchorCtr="0">
-                    <a:solidFill>
-                      <a:schemeClr val="accent2"/>
-                    </a:solidFill>
-                  </a:tcPr>
-                </a:tc>
-                <a:tc>
-                  <a:txBody>
-                    <a:bodyPr/>
-                    <a:p>
-                      <a:pPr algn="ctr">
-                        <a:buNone/>
-                      </a:pPr>
-                      <a:r>
-                        <a:rPr lang="pl-PL" altLang="en-US" b="1">
-                          <a:solidFill>
-                            <a:schemeClr val="bg1"/>
-                          </a:solidFill>
-                        </a:rPr>
                         <a:t>7</a:t>
                       </a:r>
                       <a:endParaRPr lang="pl-PL" altLang="en-US" b="1">
@@ -4089,7 +4983,7 @@
                             <a:schemeClr val="bg1"/>
                           </a:solidFill>
                         </a:rPr>
-                        <a:t>1</a:t>
+                        <a:t>2</a:t>
                       </a:r>
                       <a:endParaRPr lang="pl-PL" altLang="en-US" b="1">
                         <a:solidFill>
@@ -4104,8 +4998,36 @@
                     </a:solidFill>
                   </a:tcPr>
                 </a:tc>
+                <a:tc>
+                  <a:txBody>
+                    <a:bodyPr/>
+                    <a:p>
+                      <a:pPr algn="ctr">
+                        <a:buNone/>
+                      </a:pPr>
+                      <a:r>
+                        <a:rPr lang="pl-PL" altLang="en-US" b="1">
+                          <a:solidFill>
+                            <a:schemeClr val="bg1"/>
+                          </a:solidFill>
+                        </a:rPr>
+                        <a:t>1</a:t>
+                      </a:r>
+                      <a:endParaRPr lang="pl-PL" altLang="en-US" b="1">
+                        <a:solidFill>
+                          <a:schemeClr val="bg1"/>
+                        </a:solidFill>
+                      </a:endParaRPr>
+                    </a:p>
+                  </a:txBody>
+                  <a:tcPr anchor="ctr" anchorCtr="0">
+                    <a:solidFill>
+                      <a:schemeClr val="accent2"/>
+                    </a:solidFill>
+                  </a:tcPr>
+                </a:tc>
               </a:tr>
-              <a:tr h="430530">
+              <a:tr h="631190">
                 <a:tc>
                   <a:txBody>
                     <a:bodyPr/>
@@ -4150,428 +5072,6 @@
                             <a:schemeClr val="bg1"/>
                           </a:solidFill>
                         </a:rPr>
-                        <a:t>0.667</a:t>
-                      </a:r>
-                      <a:endParaRPr lang="pl-PL" altLang="en-US" b="1">
-                        <a:solidFill>
-                          <a:schemeClr val="bg1"/>
-                        </a:solidFill>
-                      </a:endParaRPr>
-                    </a:p>
-                  </a:txBody>
-                  <a:tcPr anchor="ctr" anchorCtr="0">
-                    <a:solidFill>
-                      <a:schemeClr val="accent1"/>
-                    </a:solidFill>
-                  </a:tcPr>
-                </a:tc>
-                <a:tc>
-                  <a:txBody>
-                    <a:bodyPr/>
-                    <a:p>
-                      <a:pPr algn="ctr">
-                        <a:buNone/>
-                      </a:pPr>
-                      <a:r>
-                        <a:rPr lang="pl-PL" altLang="en-US" b="1">
-                          <a:solidFill>
-                            <a:schemeClr val="bg1"/>
-                          </a:solidFill>
-                        </a:rPr>
-                        <a:t>1</a:t>
-                      </a:r>
-                      <a:endParaRPr lang="pl-PL" altLang="en-US" b="1">
-                        <a:solidFill>
-                          <a:schemeClr val="bg1"/>
-                        </a:solidFill>
-                      </a:endParaRPr>
-                    </a:p>
-                  </a:txBody>
-                  <a:tcPr anchor="ctr" anchorCtr="0">
-                    <a:solidFill>
-                      <a:schemeClr val="accent1"/>
-                    </a:solidFill>
-                  </a:tcPr>
-                </a:tc>
-                <a:tc>
-                  <a:txBody>
-                    <a:bodyPr/>
-                    <a:p>
-                      <a:pPr algn="ctr">
-                        <a:buNone/>
-                      </a:pPr>
-                      <a:r>
-                        <a:rPr lang="pl-PL" altLang="en-US" b="1">
-                          <a:solidFill>
-                            <a:schemeClr val="bg1"/>
-                          </a:solidFill>
-                        </a:rPr>
-                        <a:t>0.5</a:t>
-                      </a:r>
-                      <a:endParaRPr lang="pl-PL" altLang="en-US" b="1">
-                        <a:solidFill>
-                          <a:schemeClr val="bg1"/>
-                        </a:solidFill>
-                      </a:endParaRPr>
-                    </a:p>
-                  </a:txBody>
-                  <a:tcPr anchor="ctr" anchorCtr="0">
-                    <a:solidFill>
-                      <a:schemeClr val="accent1"/>
-                    </a:solidFill>
-                  </a:tcPr>
-                </a:tc>
-                <a:tc>
-                  <a:txBody>
-                    <a:bodyPr/>
-                    <a:p>
-                      <a:pPr algn="ctr">
-                        <a:buNone/>
-                      </a:pPr>
-                      <a:r>
-                        <a:rPr lang="pl-PL" altLang="en-US" b="1">
-                          <a:solidFill>
-                            <a:schemeClr val="bg1"/>
-                          </a:solidFill>
-                        </a:rPr>
-                        <a:t>0.5</a:t>
-                      </a:r>
-                      <a:endParaRPr lang="pl-PL" altLang="en-US" b="1">
-                        <a:solidFill>
-                          <a:schemeClr val="bg1"/>
-                        </a:solidFill>
-                      </a:endParaRPr>
-                    </a:p>
-                  </a:txBody>
-                  <a:tcPr anchor="ctr" anchorCtr="0">
-                    <a:solidFill>
-                      <a:schemeClr val="accent1"/>
-                    </a:solidFill>
-                  </a:tcPr>
-                </a:tc>
-              </a:tr>
-            </a:tbl>
-          </a:graphicData>
-        </a:graphic>
-      </p:graphicFrame>
-      <p:graphicFrame>
-        <p:nvGraphicFramePr>
-          <p:cNvPr id="5" name="Table 4"/>
-          <p:cNvGraphicFramePr/>
-          <p:nvPr/>
-        </p:nvGraphicFramePr>
-        <p:xfrm>
-          <a:off x="838200" y="4043045"/>
-          <a:ext cx="10515600" cy="1925320"/>
-        </p:xfrm>
-        <a:graphic>
-          <a:graphicData uri="http://schemas.openxmlformats.org/drawingml/2006/table">
-            <a:tbl>
-              <a:tblPr firstRow="1" bandRow="1">
-                <a:tableStyleId>{5C22544A-7EE6-4342-B048-85BDC9FD1C3A}</a:tableStyleId>
-              </a:tblPr>
-              <a:tblGrid>
-                <a:gridCol w="2103120"/>
-                <a:gridCol w="2103120"/>
-                <a:gridCol w="2103120"/>
-                <a:gridCol w="2103120"/>
-                <a:gridCol w="2103120"/>
-              </a:tblGrid>
-              <a:tr h="709930">
-                <a:tc>
-                  <a:txBody>
-                    <a:bodyPr/>
-                    <a:p>
-                      <a:pPr algn="ctr">
-                        <a:buNone/>
-                      </a:pPr>
-                      <a:r>
-                        <a:rPr lang="pl-PL" altLang="en-US"/>
-                        <a:t>Waga [kg]</a:t>
-                      </a:r>
-                      <a:endParaRPr lang="pl-PL" altLang="en-US"/>
-                    </a:p>
-                  </a:txBody>
-                  <a:tcPr anchor="ctr" anchorCtr="0">
-                    <a:solidFill>
-                      <a:schemeClr val="accent1">
-                        <a:lumMod val="60000"/>
-                        <a:lumOff val="40000"/>
-                      </a:schemeClr>
-                    </a:solidFill>
-                  </a:tcPr>
-                </a:tc>
-                <a:tc>
-                  <a:txBody>
-                    <a:bodyPr/>
-                    <a:p>
-                      <a:pPr algn="ctr">
-                        <a:buNone/>
-                      </a:pPr>
-                      <a:r>
-                        <a:rPr lang="pl-PL" altLang="en-US"/>
-                        <a:t>7</a:t>
-                      </a:r>
-                      <a:endParaRPr lang="pl-PL" altLang="en-US"/>
-                    </a:p>
-                  </a:txBody>
-                  <a:tcPr anchor="ctr" anchorCtr="0">
-                    <a:solidFill>
-                      <a:schemeClr val="accent2"/>
-                    </a:solidFill>
-                  </a:tcPr>
-                </a:tc>
-                <a:tc>
-                  <a:txBody>
-                    <a:bodyPr/>
-                    <a:p>
-                      <a:pPr algn="ctr">
-                        <a:buNone/>
-                      </a:pPr>
-                      <a:r>
-                        <a:rPr lang="pl-PL" altLang="en-US"/>
-                        <a:t>3</a:t>
-                      </a:r>
-                      <a:endParaRPr lang="pl-PL" altLang="en-US"/>
-                    </a:p>
-                  </a:txBody>
-                  <a:tcPr anchor="ctr" anchorCtr="0">
-                    <a:solidFill>
-                      <a:schemeClr val="accent2"/>
-                    </a:solidFill>
-                  </a:tcPr>
-                </a:tc>
-                <a:tc>
-                  <a:txBody>
-                    <a:bodyPr/>
-                    <a:p>
-                      <a:pPr algn="ctr">
-                        <a:buNone/>
-                      </a:pPr>
-                      <a:r>
-                        <a:rPr lang="pl-PL" altLang="en-US"/>
-                        <a:t>4</a:t>
-                      </a:r>
-                      <a:endParaRPr lang="pl-PL" altLang="en-US"/>
-                    </a:p>
-                  </a:txBody>
-                  <a:tcPr anchor="ctr" anchorCtr="0">
-                    <a:solidFill>
-                      <a:schemeClr val="accent2"/>
-                    </a:solidFill>
-                  </a:tcPr>
-                </a:tc>
-                <a:tc>
-                  <a:txBody>
-                    <a:bodyPr/>
-                    <a:p>
-                      <a:pPr algn="ctr">
-                        <a:buNone/>
-                      </a:pPr>
-                      <a:r>
-                        <a:rPr lang="pl-PL" altLang="en-US"/>
-                        <a:t>2</a:t>
-                      </a:r>
-                      <a:endParaRPr lang="pl-PL" altLang="en-US"/>
-                    </a:p>
-                  </a:txBody>
-                  <a:tcPr anchor="ctr" anchorCtr="0">
-                    <a:solidFill>
-                      <a:schemeClr val="accent2"/>
-                    </a:solidFill>
-                  </a:tcPr>
-                </a:tc>
-              </a:tr>
-              <a:tr h="584200">
-                <a:tc>
-                  <a:txBody>
-                    <a:bodyPr/>
-                    <a:p>
-                      <a:pPr algn="ctr">
-                        <a:buNone/>
-                      </a:pPr>
-                      <a:r>
-                        <a:rPr lang="pl-PL" altLang="en-US" b="1">
-                          <a:solidFill>
-                            <a:schemeClr val="bg1"/>
-                          </a:solidFill>
-                        </a:rPr>
-                        <a:t>Wartość [zł]</a:t>
-                      </a:r>
-                      <a:endParaRPr lang="pl-PL" altLang="en-US" b="1">
-                        <a:solidFill>
-                          <a:schemeClr val="bg1"/>
-                        </a:solidFill>
-                      </a:endParaRPr>
-                    </a:p>
-                  </a:txBody>
-                  <a:tcPr anchor="ctr" anchorCtr="0">
-                    <a:solidFill>
-                      <a:schemeClr val="accent1">
-                        <a:lumMod val="60000"/>
-                        <a:lumOff val="40000"/>
-                      </a:schemeClr>
-                    </a:solidFill>
-                  </a:tcPr>
-                </a:tc>
-                <a:tc>
-                  <a:txBody>
-                    <a:bodyPr/>
-                    <a:p>
-                      <a:pPr algn="ctr">
-                        <a:buNone/>
-                      </a:pPr>
-                      <a:r>
-                        <a:rPr lang="pl-PL" altLang="en-US" b="1">
-                          <a:solidFill>
-                            <a:schemeClr val="bg1"/>
-                          </a:solidFill>
-                        </a:rPr>
-                        <a:t>7</a:t>
-                      </a:r>
-                      <a:endParaRPr lang="pl-PL" altLang="en-US" b="1">
-                        <a:solidFill>
-                          <a:schemeClr val="bg1"/>
-                        </a:solidFill>
-                      </a:endParaRPr>
-                    </a:p>
-                  </a:txBody>
-                  <a:tcPr anchor="ctr" anchorCtr="0">
-                    <a:solidFill>
-                      <a:schemeClr val="accent2"/>
-                    </a:solidFill>
-                  </a:tcPr>
-                </a:tc>
-                <a:tc>
-                  <a:txBody>
-                    <a:bodyPr/>
-                    <a:p>
-                      <a:pPr algn="ctr">
-                        <a:buNone/>
-                      </a:pPr>
-                      <a:r>
-                        <a:rPr lang="pl-PL" altLang="en-US" b="1">
-                          <a:solidFill>
-                            <a:schemeClr val="bg1"/>
-                          </a:solidFill>
-                        </a:rPr>
-                        <a:t>2</a:t>
-                      </a:r>
-                      <a:endParaRPr lang="pl-PL" altLang="en-US" b="1">
-                        <a:solidFill>
-                          <a:schemeClr val="bg1"/>
-                        </a:solidFill>
-                      </a:endParaRPr>
-                    </a:p>
-                  </a:txBody>
-                  <a:tcPr anchor="ctr" anchorCtr="0">
-                    <a:solidFill>
-                      <a:schemeClr val="accent2"/>
-                    </a:solidFill>
-                  </a:tcPr>
-                </a:tc>
-                <a:tc>
-                  <a:txBody>
-                    <a:bodyPr/>
-                    <a:p>
-                      <a:pPr algn="ctr">
-                        <a:buNone/>
-                      </a:pPr>
-                      <a:r>
-                        <a:rPr lang="pl-PL" altLang="en-US" b="1">
-                          <a:solidFill>
-                            <a:schemeClr val="bg1"/>
-                          </a:solidFill>
-                        </a:rPr>
-                        <a:t>2</a:t>
-                      </a:r>
-                      <a:endParaRPr lang="pl-PL" altLang="en-US" b="1">
-                        <a:solidFill>
-                          <a:schemeClr val="bg1"/>
-                        </a:solidFill>
-                      </a:endParaRPr>
-                    </a:p>
-                  </a:txBody>
-                  <a:tcPr anchor="ctr" anchorCtr="0">
-                    <a:solidFill>
-                      <a:schemeClr val="accent2"/>
-                    </a:solidFill>
-                  </a:tcPr>
-                </a:tc>
-                <a:tc>
-                  <a:txBody>
-                    <a:bodyPr/>
-                    <a:p>
-                      <a:pPr algn="ctr">
-                        <a:buNone/>
-                      </a:pPr>
-                      <a:r>
-                        <a:rPr lang="pl-PL" altLang="en-US" b="1">
-                          <a:solidFill>
-                            <a:schemeClr val="bg1"/>
-                          </a:solidFill>
-                        </a:rPr>
-                        <a:t>1</a:t>
-                      </a:r>
-                      <a:endParaRPr lang="pl-PL" altLang="en-US" b="1">
-                        <a:solidFill>
-                          <a:schemeClr val="bg1"/>
-                        </a:solidFill>
-                      </a:endParaRPr>
-                    </a:p>
-                  </a:txBody>
-                  <a:tcPr anchor="ctr" anchorCtr="0">
-                    <a:solidFill>
-                      <a:schemeClr val="accent2"/>
-                    </a:solidFill>
-                  </a:tcPr>
-                </a:tc>
-              </a:tr>
-              <a:tr h="631190">
-                <a:tc>
-                  <a:txBody>
-                    <a:bodyPr/>
-                    <a:p>
-                      <a:pPr algn="ctr">
-                        <a:buNone/>
-                      </a:pPr>
-                      <a:r>
-                        <a:rPr lang="pl-PL" altLang="en-US" b="1">
-                          <a:solidFill>
-                            <a:schemeClr val="bg1"/>
-                          </a:solidFill>
-                        </a:rPr>
-                        <a:t>Współczynnik</a:t>
-                      </a:r>
-                      <a:endParaRPr lang="pl-PL" altLang="en-US" b="1">
-                        <a:solidFill>
-                          <a:schemeClr val="bg1"/>
-                        </a:solidFill>
-                      </a:endParaRPr>
-                    </a:p>
-                  </a:txBody>
-                  <a:tcPr anchor="ctr" anchorCtr="0">
-                    <a:solidFill>
-                      <a:schemeClr val="accent1">
-                        <a:lumMod val="60000"/>
-                        <a:lumOff val="40000"/>
-                      </a:schemeClr>
-                    </a:solidFill>
-                  </a:tcPr>
-                </a:tc>
-                <a:tc>
-                  <a:txBody>
-                    <a:bodyPr/>
-                    <a:p>
-                      <a:pPr algn="ctr">
-                        <a:buNone/>
-                      </a:pPr>
-                      <a:r>
-                        <a:rPr lang="pl-PL" altLang="en-US" b="1">
-                          <a:solidFill>
-                            <a:schemeClr val="bg1"/>
-                          </a:solidFill>
-                        </a:rPr>
                         <a:t>1</a:t>
                       </a:r>
                       <a:endParaRPr lang="pl-PL" altLang="en-US" b="1">
@@ -4678,14 +5178,14 @@
       </p:graphicFrame>
       <p:sp>
         <p:nvSpPr>
-          <p:cNvPr id="11" name="Text Box 10"/>
+          <p:cNvPr id="7" name="Text Box 6"/>
           <p:cNvSpPr txBox="1"/>
           <p:nvPr/>
         </p:nvSpPr>
         <p:spPr>
           <a:xfrm>
-            <a:off x="3749040" y="1084580"/>
-            <a:ext cx="4693920" cy="579120"/>
+            <a:off x="2819400" y="1040765"/>
+            <a:ext cx="6005195" cy="579120"/>
           </a:xfrm>
           <a:prstGeom prst="rect">
             <a:avLst/>
@@ -4695,6 +5195,10 @@
         <p:txBody>
           <a:bodyPr wrap="square" rtlCol="0">
             <a:spAutoFit/>
+            <a:scene3d>
+              <a:camera prst="orthographicFront"/>
+              <a:lightRig rig="threePt" dir="t"/>
+            </a:scene3d>
           </a:bodyPr>
           <a:p>
             <a:pPr algn="ctr"/>
@@ -4714,7 +5218,7 @@
                 </a:solidFill>
                 <a:effectLst/>
               </a:rPr>
-              <a:t>Sortowanie przedmiotów</a:t>
+              <a:t>Pakowanie przedmiotów</a:t>
             </a:r>
             <a:endParaRPr lang="pl-PL" altLang="en-US" sz="3200">
               <a:ln w="22225">
@@ -4769,7 +5273,7 @@
             <a:pPr algn="ctr"/>
             <a:r>
               <a:rPr lang="pl-PL" altLang="en-US"/>
-              <a:t>Przykład</a:t>
+              <a:t>Podsumowanie</a:t>
             </a:r>
             <a:endParaRPr lang="pl-PL" altLang="en-US"/>
           </a:p>
@@ -4782,523 +5286,38 @@
             <a:spLocks noGrp="1"/>
           </p:cNvSpPr>
           <p:nvPr>
-            <p:ph sz="half" idx="1"/>
+            <p:ph idx="1"/>
           </p:nvPr>
         </p:nvSpPr>
-        <p:spPr>
-          <a:xfrm>
-            <a:off x="1539240" y="3911600"/>
-            <a:ext cx="9895205" cy="2432050"/>
-          </a:xfrm>
-        </p:spPr>
+        <p:spPr/>
         <p:txBody>
           <a:bodyPr/>
           <a:p>
             <a:r>
               <a:rPr lang="pl-PL" altLang="en-US"/>
-              <a:t>Idąc od lewej strony:</a:t>
+              <a:t>Zarobiliśmy 18 zł.</a:t>
             </a:r>
             <a:endParaRPr lang="pl-PL" altLang="en-US"/>
           </a:p>
           <a:p>
+            <a:endParaRPr lang="pl-PL" altLang="en-US"/>
+          </a:p>
+          <a:p>
             <a:r>
               <a:rPr lang="pl-PL" altLang="en-US"/>
-              <a:t>1) pakujemy 2 przedmioty o masie 7 ( w plecaku zostaje miejsce na 6 kg)</a:t>
+              <a:t>Algorytm ten nie daje nam pewności, że rozwiązanie jest optymalne( w większości przypadków jest).</a:t>
             </a:r>
             <a:endParaRPr lang="pl-PL" altLang="en-US"/>
           </a:p>
           <a:p>
+            <a:endParaRPr lang="pl-PL" altLang="en-US"/>
+          </a:p>
+          <a:p>
             <a:r>
               <a:rPr lang="pl-PL" altLang="en-US"/>
-              <a:t>2) pakujemy 2 przedmioty o masie 3 ( plecak pełny)</a:t>
+              <a:t>W zamian daje nam bardzo dobrą złożoność obliczeniową O ( nlogn)</a:t>
             </a:r>
             <a:endParaRPr lang="pl-PL" altLang="en-US"/>
-          </a:p>
-        </p:txBody>
-      </p:sp>
-      <p:graphicFrame>
-        <p:nvGraphicFramePr>
-          <p:cNvPr id="6" name="Content Placeholder 5"/>
-          <p:cNvGraphicFramePr/>
-          <p:nvPr>
-            <p:ph sz="half" idx="2"/>
-          </p:nvPr>
-        </p:nvGraphicFramePr>
-        <p:xfrm>
-          <a:off x="1539240" y="1788160"/>
-          <a:ext cx="8651875" cy="1925320"/>
-        </p:xfrm>
-        <a:graphic>
-          <a:graphicData uri="http://schemas.openxmlformats.org/drawingml/2006/table">
-            <a:tbl>
-              <a:tblPr firstRow="1" bandRow="1">
-                <a:tableStyleId>{5C22544A-7EE6-4342-B048-85BDC9FD1C3A}</a:tableStyleId>
-              </a:tblPr>
-              <a:tblGrid>
-                <a:gridCol w="1729740"/>
-                <a:gridCol w="1731010"/>
-                <a:gridCol w="1730375"/>
-                <a:gridCol w="1731010"/>
-                <a:gridCol w="1729740"/>
-              </a:tblGrid>
-              <a:tr h="709930">
-                <a:tc>
-                  <a:txBody>
-                    <a:bodyPr/>
-                    <a:p>
-                      <a:pPr algn="ctr">
-                        <a:buNone/>
-                      </a:pPr>
-                      <a:r>
-                        <a:rPr lang="pl-PL" altLang="en-US"/>
-                        <a:t>Waga [kg]</a:t>
-                      </a:r>
-                      <a:endParaRPr lang="pl-PL" altLang="en-US"/>
-                    </a:p>
-                  </a:txBody>
-                  <a:tcPr anchor="ctr" anchorCtr="0">
-                    <a:solidFill>
-                      <a:schemeClr val="accent1">
-                        <a:lumMod val="60000"/>
-                        <a:lumOff val="40000"/>
-                      </a:schemeClr>
-                    </a:solidFill>
-                  </a:tcPr>
-                </a:tc>
-                <a:tc>
-                  <a:txBody>
-                    <a:bodyPr/>
-                    <a:p>
-                      <a:pPr algn="ctr">
-                        <a:buNone/>
-                      </a:pPr>
-                      <a:r>
-                        <a:rPr lang="pl-PL" altLang="en-US"/>
-                        <a:t>7</a:t>
-                      </a:r>
-                      <a:endParaRPr lang="pl-PL" altLang="en-US"/>
-                    </a:p>
-                  </a:txBody>
-                  <a:tcPr anchor="ctr" anchorCtr="0">
-                    <a:solidFill>
-                      <a:schemeClr val="accent2"/>
-                    </a:solidFill>
-                  </a:tcPr>
-                </a:tc>
-                <a:tc>
-                  <a:txBody>
-                    <a:bodyPr/>
-                    <a:p>
-                      <a:pPr algn="ctr">
-                        <a:buNone/>
-                      </a:pPr>
-                      <a:r>
-                        <a:rPr lang="pl-PL" altLang="en-US"/>
-                        <a:t>3</a:t>
-                      </a:r>
-                      <a:endParaRPr lang="pl-PL" altLang="en-US"/>
-                    </a:p>
-                  </a:txBody>
-                  <a:tcPr anchor="ctr" anchorCtr="0">
-                    <a:solidFill>
-                      <a:schemeClr val="accent2"/>
-                    </a:solidFill>
-                  </a:tcPr>
-                </a:tc>
-                <a:tc>
-                  <a:txBody>
-                    <a:bodyPr/>
-                    <a:p>
-                      <a:pPr algn="ctr">
-                        <a:buNone/>
-                      </a:pPr>
-                      <a:r>
-                        <a:rPr lang="pl-PL" altLang="en-US"/>
-                        <a:t>4</a:t>
-                      </a:r>
-                      <a:endParaRPr lang="pl-PL" altLang="en-US"/>
-                    </a:p>
-                  </a:txBody>
-                  <a:tcPr anchor="ctr" anchorCtr="0">
-                    <a:solidFill>
-                      <a:schemeClr val="accent2"/>
-                    </a:solidFill>
-                  </a:tcPr>
-                </a:tc>
-                <a:tc>
-                  <a:txBody>
-                    <a:bodyPr/>
-                    <a:p>
-                      <a:pPr algn="ctr">
-                        <a:buNone/>
-                      </a:pPr>
-                      <a:r>
-                        <a:rPr lang="pl-PL" altLang="en-US"/>
-                        <a:t>2</a:t>
-                      </a:r>
-                      <a:endParaRPr lang="pl-PL" altLang="en-US"/>
-                    </a:p>
-                  </a:txBody>
-                  <a:tcPr anchor="ctr" anchorCtr="0">
-                    <a:solidFill>
-                      <a:schemeClr val="accent2"/>
-                    </a:solidFill>
-                  </a:tcPr>
-                </a:tc>
-              </a:tr>
-              <a:tr h="584200">
-                <a:tc>
-                  <a:txBody>
-                    <a:bodyPr/>
-                    <a:p>
-                      <a:pPr algn="ctr">
-                        <a:buNone/>
-                      </a:pPr>
-                      <a:r>
-                        <a:rPr lang="pl-PL" altLang="en-US" b="1">
-                          <a:solidFill>
-                            <a:schemeClr val="bg1"/>
-                          </a:solidFill>
-                        </a:rPr>
-                        <a:t>Wartość [zł]</a:t>
-                      </a:r>
-                      <a:endParaRPr lang="pl-PL" altLang="en-US" b="1">
-                        <a:solidFill>
-                          <a:schemeClr val="bg1"/>
-                        </a:solidFill>
-                      </a:endParaRPr>
-                    </a:p>
-                  </a:txBody>
-                  <a:tcPr anchor="ctr" anchorCtr="0">
-                    <a:solidFill>
-                      <a:schemeClr val="accent1">
-                        <a:lumMod val="60000"/>
-                        <a:lumOff val="40000"/>
-                      </a:schemeClr>
-                    </a:solidFill>
-                  </a:tcPr>
-                </a:tc>
-                <a:tc>
-                  <a:txBody>
-                    <a:bodyPr/>
-                    <a:p>
-                      <a:pPr algn="ctr">
-                        <a:buNone/>
-                      </a:pPr>
-                      <a:r>
-                        <a:rPr lang="pl-PL" altLang="en-US" b="1">
-                          <a:solidFill>
-                            <a:schemeClr val="bg1"/>
-                          </a:solidFill>
-                        </a:rPr>
-                        <a:t>7</a:t>
-                      </a:r>
-                      <a:endParaRPr lang="pl-PL" altLang="en-US" b="1">
-                        <a:solidFill>
-                          <a:schemeClr val="bg1"/>
-                        </a:solidFill>
-                      </a:endParaRPr>
-                    </a:p>
-                  </a:txBody>
-                  <a:tcPr anchor="ctr" anchorCtr="0">
-                    <a:solidFill>
-                      <a:schemeClr val="accent2"/>
-                    </a:solidFill>
-                  </a:tcPr>
-                </a:tc>
-                <a:tc>
-                  <a:txBody>
-                    <a:bodyPr/>
-                    <a:p>
-                      <a:pPr algn="ctr">
-                        <a:buNone/>
-                      </a:pPr>
-                      <a:r>
-                        <a:rPr lang="pl-PL" altLang="en-US" b="1">
-                          <a:solidFill>
-                            <a:schemeClr val="bg1"/>
-                          </a:solidFill>
-                        </a:rPr>
-                        <a:t>2</a:t>
-                      </a:r>
-                      <a:endParaRPr lang="pl-PL" altLang="en-US" b="1">
-                        <a:solidFill>
-                          <a:schemeClr val="bg1"/>
-                        </a:solidFill>
-                      </a:endParaRPr>
-                    </a:p>
-                  </a:txBody>
-                  <a:tcPr anchor="ctr" anchorCtr="0">
-                    <a:solidFill>
-                      <a:schemeClr val="accent2"/>
-                    </a:solidFill>
-                  </a:tcPr>
-                </a:tc>
-                <a:tc>
-                  <a:txBody>
-                    <a:bodyPr/>
-                    <a:p>
-                      <a:pPr algn="ctr">
-                        <a:buNone/>
-                      </a:pPr>
-                      <a:r>
-                        <a:rPr lang="pl-PL" altLang="en-US" b="1">
-                          <a:solidFill>
-                            <a:schemeClr val="bg1"/>
-                          </a:solidFill>
-                        </a:rPr>
-                        <a:t>2</a:t>
-                      </a:r>
-                      <a:endParaRPr lang="pl-PL" altLang="en-US" b="1">
-                        <a:solidFill>
-                          <a:schemeClr val="bg1"/>
-                        </a:solidFill>
-                      </a:endParaRPr>
-                    </a:p>
-                  </a:txBody>
-                  <a:tcPr anchor="ctr" anchorCtr="0">
-                    <a:solidFill>
-                      <a:schemeClr val="accent2"/>
-                    </a:solidFill>
-                  </a:tcPr>
-                </a:tc>
-                <a:tc>
-                  <a:txBody>
-                    <a:bodyPr/>
-                    <a:p>
-                      <a:pPr algn="ctr">
-                        <a:buNone/>
-                      </a:pPr>
-                      <a:r>
-                        <a:rPr lang="pl-PL" altLang="en-US" b="1">
-                          <a:solidFill>
-                            <a:schemeClr val="bg1"/>
-                          </a:solidFill>
-                        </a:rPr>
-                        <a:t>1</a:t>
-                      </a:r>
-                      <a:endParaRPr lang="pl-PL" altLang="en-US" b="1">
-                        <a:solidFill>
-                          <a:schemeClr val="bg1"/>
-                        </a:solidFill>
-                      </a:endParaRPr>
-                    </a:p>
-                  </a:txBody>
-                  <a:tcPr anchor="ctr" anchorCtr="0">
-                    <a:solidFill>
-                      <a:schemeClr val="accent2"/>
-                    </a:solidFill>
-                  </a:tcPr>
-                </a:tc>
-              </a:tr>
-              <a:tr h="631190">
-                <a:tc>
-                  <a:txBody>
-                    <a:bodyPr/>
-                    <a:p>
-                      <a:pPr algn="ctr">
-                        <a:buNone/>
-                      </a:pPr>
-                      <a:r>
-                        <a:rPr lang="pl-PL" altLang="en-US" b="1">
-                          <a:solidFill>
-                            <a:schemeClr val="bg1"/>
-                          </a:solidFill>
-                        </a:rPr>
-                        <a:t>Współczynnik</a:t>
-                      </a:r>
-                      <a:endParaRPr lang="pl-PL" altLang="en-US" b="1">
-                        <a:solidFill>
-                          <a:schemeClr val="bg1"/>
-                        </a:solidFill>
-                      </a:endParaRPr>
-                    </a:p>
-                  </a:txBody>
-                  <a:tcPr anchor="ctr" anchorCtr="0">
-                    <a:solidFill>
-                      <a:schemeClr val="accent1">
-                        <a:lumMod val="60000"/>
-                        <a:lumOff val="40000"/>
-                      </a:schemeClr>
-                    </a:solidFill>
-                  </a:tcPr>
-                </a:tc>
-                <a:tc>
-                  <a:txBody>
-                    <a:bodyPr/>
-                    <a:p>
-                      <a:pPr algn="ctr">
-                        <a:buNone/>
-                      </a:pPr>
-                      <a:r>
-                        <a:rPr lang="pl-PL" altLang="en-US" b="1">
-                          <a:solidFill>
-                            <a:schemeClr val="bg1"/>
-                          </a:solidFill>
-                        </a:rPr>
-                        <a:t>1</a:t>
-                      </a:r>
-                      <a:endParaRPr lang="pl-PL" altLang="en-US" b="1">
-                        <a:solidFill>
-                          <a:schemeClr val="bg1"/>
-                        </a:solidFill>
-                      </a:endParaRPr>
-                    </a:p>
-                  </a:txBody>
-                  <a:tcPr anchor="ctr" anchorCtr="0">
-                    <a:solidFill>
-                      <a:schemeClr val="accent1"/>
-                    </a:solidFill>
-                  </a:tcPr>
-                </a:tc>
-                <a:tc>
-                  <a:txBody>
-                    <a:bodyPr/>
-                    <a:p>
-                      <a:pPr algn="ctr">
-                        <a:buNone/>
-                      </a:pPr>
-                      <a:r>
-                        <a:rPr lang="pl-PL" altLang="en-US" b="1">
-                          <a:solidFill>
-                            <a:schemeClr val="bg1"/>
-                          </a:solidFill>
-                        </a:rPr>
-                        <a:t>0.667</a:t>
-                      </a:r>
-                      <a:endParaRPr lang="pl-PL" altLang="en-US" b="1">
-                        <a:solidFill>
-                          <a:schemeClr val="bg1"/>
-                        </a:solidFill>
-                      </a:endParaRPr>
-                    </a:p>
-                  </a:txBody>
-                  <a:tcPr anchor="ctr" anchorCtr="0">
-                    <a:solidFill>
-                      <a:schemeClr val="accent1"/>
-                    </a:solidFill>
-                  </a:tcPr>
-                </a:tc>
-                <a:tc>
-                  <a:txBody>
-                    <a:bodyPr/>
-                    <a:p>
-                      <a:pPr algn="ctr">
-                        <a:buNone/>
-                      </a:pPr>
-                      <a:r>
-                        <a:rPr lang="pl-PL" altLang="en-US" b="1">
-                          <a:solidFill>
-                            <a:schemeClr val="bg1"/>
-                          </a:solidFill>
-                        </a:rPr>
-                        <a:t>0.5</a:t>
-                      </a:r>
-                      <a:endParaRPr lang="pl-PL" altLang="en-US" b="1">
-                        <a:solidFill>
-                          <a:schemeClr val="bg1"/>
-                        </a:solidFill>
-                      </a:endParaRPr>
-                    </a:p>
-                  </a:txBody>
-                  <a:tcPr anchor="ctr" anchorCtr="0">
-                    <a:solidFill>
-                      <a:schemeClr val="accent1"/>
-                    </a:solidFill>
-                  </a:tcPr>
-                </a:tc>
-                <a:tc>
-                  <a:txBody>
-                    <a:bodyPr/>
-                    <a:p>
-                      <a:pPr algn="ctr">
-                        <a:buNone/>
-                      </a:pPr>
-                      <a:r>
-                        <a:rPr lang="pl-PL" altLang="en-US" b="1">
-                          <a:solidFill>
-                            <a:schemeClr val="bg1"/>
-                          </a:solidFill>
-                        </a:rPr>
-                        <a:t>0.5</a:t>
-                      </a:r>
-                      <a:endParaRPr lang="pl-PL" altLang="en-US" b="1">
-                        <a:solidFill>
-                          <a:schemeClr val="bg1"/>
-                        </a:solidFill>
-                      </a:endParaRPr>
-                    </a:p>
-                  </a:txBody>
-                  <a:tcPr anchor="ctr" anchorCtr="0">
-                    <a:solidFill>
-                      <a:schemeClr val="accent1"/>
-                    </a:solidFill>
-                  </a:tcPr>
-                </a:tc>
-              </a:tr>
-            </a:tbl>
-          </a:graphicData>
-        </a:graphic>
-      </p:graphicFrame>
-      <p:sp>
-        <p:nvSpPr>
-          <p:cNvPr id="7" name="Text Box 6"/>
-          <p:cNvSpPr txBox="1"/>
-          <p:nvPr/>
-        </p:nvSpPr>
-        <p:spPr>
-          <a:xfrm>
-            <a:off x="2819400" y="1040765"/>
-            <a:ext cx="6005195" cy="579120"/>
-          </a:xfrm>
-          <a:prstGeom prst="rect">
-            <a:avLst/>
-          </a:prstGeom>
-          <a:noFill/>
-        </p:spPr>
-        <p:txBody>
-          <a:bodyPr wrap="square" rtlCol="0">
-            <a:spAutoFit/>
-            <a:scene3d>
-              <a:camera prst="orthographicFront"/>
-              <a:lightRig rig="threePt" dir="t"/>
-            </a:scene3d>
-          </a:bodyPr>
-          <a:p>
-            <a:pPr algn="ctr"/>
-            <a:r>
-              <a:rPr lang="pl-PL" altLang="en-US" sz="3200">
-                <a:ln w="22225">
-                  <a:solidFill>
-                    <a:schemeClr val="accent2"/>
-                  </a:solidFill>
-                  <a:prstDash val="solid"/>
-                </a:ln>
-                <a:solidFill>
-                  <a:schemeClr val="accent2">
-                    <a:lumMod val="40000"/>
-                    <a:lumOff val="60000"/>
-                  </a:schemeClr>
-                </a:solidFill>
-                <a:effectLst/>
-              </a:rPr>
-              <a:t>Pakowanie przedmiotów</a:t>
-            </a:r>
-            <a:endParaRPr lang="pl-PL" altLang="en-US" sz="3200">
-              <a:ln w="22225">
-                <a:solidFill>
-                  <a:schemeClr val="accent2"/>
-                </a:solidFill>
-                <a:prstDash val="solid"/>
-              </a:ln>
-              <a:solidFill>
-                <a:schemeClr val="accent2">
-                  <a:lumMod val="40000"/>
-                  <a:lumOff val="60000"/>
-                </a:schemeClr>
-              </a:solidFill>
-              <a:effectLst/>
-            </a:endParaRPr>
           </a:p>
         </p:txBody>
       </p:sp>
@@ -5322,89 +5341,6 @@
       <p:grpSpPr/>
       <p:sp>
         <p:nvSpPr>
-          <p:cNvPr id="2" name="Title 1"/>
-          <p:cNvSpPr>
-            <a:spLocks noGrp="1"/>
-          </p:cNvSpPr>
-          <p:nvPr>
-            <p:ph type="title"/>
-          </p:nvPr>
-        </p:nvSpPr>
-        <p:spPr/>
-        <p:txBody>
-          <a:bodyPr/>
-          <a:p>
-            <a:pPr algn="ctr"/>
-            <a:r>
-              <a:rPr lang="pl-PL" altLang="en-US"/>
-              <a:t>Podsumowanie</a:t>
-            </a:r>
-            <a:endParaRPr lang="pl-PL" altLang="en-US"/>
-          </a:p>
-        </p:txBody>
-      </p:sp>
-      <p:sp>
-        <p:nvSpPr>
-          <p:cNvPr id="3" name="Content Placeholder 2"/>
-          <p:cNvSpPr>
-            <a:spLocks noGrp="1"/>
-          </p:cNvSpPr>
-          <p:nvPr>
-            <p:ph idx="1"/>
-          </p:nvPr>
-        </p:nvSpPr>
-        <p:spPr/>
-        <p:txBody>
-          <a:bodyPr/>
-          <a:p>
-            <a:r>
-              <a:rPr lang="pl-PL" altLang="en-US"/>
-              <a:t>Zarobiliśmy 18 zł.</a:t>
-            </a:r>
-            <a:endParaRPr lang="pl-PL" altLang="en-US"/>
-          </a:p>
-          <a:p>
-            <a:endParaRPr lang="pl-PL" altLang="en-US"/>
-          </a:p>
-          <a:p>
-            <a:r>
-              <a:rPr lang="pl-PL" altLang="en-US"/>
-              <a:t>Algorytm ten nie daje nam pewności, że rozwiązanie jest optymalne( w większości przypadków jest).</a:t>
-            </a:r>
-            <a:endParaRPr lang="pl-PL" altLang="en-US"/>
-          </a:p>
-          <a:p>
-            <a:endParaRPr lang="pl-PL" altLang="en-US"/>
-          </a:p>
-          <a:p>
-            <a:r>
-              <a:rPr lang="pl-PL" altLang="en-US"/>
-              <a:t>W zamian daje nam bardzo dobrą złożoność obliczeniową O ( nlogn)</a:t>
-            </a:r>
-            <a:endParaRPr lang="pl-PL" altLang="en-US"/>
-          </a:p>
-        </p:txBody>
-      </p:sp>
-    </p:spTree>
-  </p:cSld>
-  <p:clrMapOvr>
-    <a:masterClrMapping/>
-  </p:clrMapOvr>
-</p:sld>
-</file>
-
-<file path=ppt/slides/slide18.xml><?xml version="1.0" encoding="utf-8"?>
-<p:sld xmlns:a="http://schemas.openxmlformats.org/drawingml/2006/main" xmlns:r="http://schemas.openxmlformats.org/officeDocument/2006/relationships" xmlns:p="http://schemas.openxmlformats.org/presentationml/2006/main">
-  <p:cSld>
-    <p:spTree>
-      <p:nvGrpSpPr>
-        <p:cNvPr id="1" name=""/>
-        <p:cNvGrpSpPr/>
-        <p:nvPr/>
-      </p:nvGrpSpPr>
-      <p:grpSpPr/>
-      <p:sp>
-        <p:nvSpPr>
           <p:cNvPr id="4" name="Title 3"/>
           <p:cNvSpPr>
             <a:spLocks noGrp="1"/>
@@ -5463,7 +5399,7 @@
 </p:sld>
 </file>
 
-<file path=ppt/slides/slide19.xml><?xml version="1.0" encoding="utf-8"?>
+<file path=ppt/slides/slide18.xml><?xml version="1.0" encoding="utf-8"?>
 <p:sld xmlns:a="http://schemas.openxmlformats.org/drawingml/2006/main" xmlns:r="http://schemas.openxmlformats.org/officeDocument/2006/relationships" xmlns:p="http://schemas.openxmlformats.org/presentationml/2006/main">
   <p:cSld>
     <p:spTree>
@@ -5563,155 +5499,7 @@
 </p:sld>
 </file>
 
-<file path=ppt/slides/slide2.xml><?xml version="1.0" encoding="utf-8"?>
-<p:sld xmlns:a="http://schemas.openxmlformats.org/drawingml/2006/main" xmlns:r="http://schemas.openxmlformats.org/officeDocument/2006/relationships" xmlns:p="http://schemas.openxmlformats.org/presentationml/2006/main">
-  <p:cSld>
-    <p:spTree>
-      <p:nvGrpSpPr>
-        <p:cNvPr id="1" name=""/>
-        <p:cNvGrpSpPr/>
-        <p:nvPr/>
-      </p:nvGrpSpPr>
-      <p:grpSpPr/>
-      <p:sp>
-        <p:nvSpPr>
-          <p:cNvPr id="2" name="Title 1"/>
-          <p:cNvSpPr>
-            <a:spLocks noGrp="1"/>
-          </p:cNvSpPr>
-          <p:nvPr>
-            <p:ph type="title"/>
-          </p:nvPr>
-        </p:nvSpPr>
-        <p:spPr/>
-        <p:txBody>
-          <a:bodyPr/>
-          <a:p>
-            <a:r>
-              <a:rPr lang="pl-PL" altLang="en-US"/>
-              <a:t>Spis Treści</a:t>
-            </a:r>
-            <a:endParaRPr lang="pl-PL" altLang="en-US"/>
-          </a:p>
-        </p:txBody>
-      </p:sp>
-      <p:sp>
-        <p:nvSpPr>
-          <p:cNvPr id="3" name="Content Placeholder 2"/>
-          <p:cNvSpPr>
-            <a:spLocks noGrp="1"/>
-          </p:cNvSpPr>
-          <p:nvPr>
-            <p:ph idx="1"/>
-          </p:nvPr>
-        </p:nvSpPr>
-        <p:spPr/>
-        <p:txBody>
-          <a:bodyPr>
-            <a:normAutofit fontScale="90000" lnSpcReduction="10000"/>
-          </a:bodyPr>
-          <a:p>
-            <a:r>
-              <a:rPr lang="pl-PL" altLang="en-US"/>
-              <a:t>1) Wstęp</a:t>
-            </a:r>
-            <a:endParaRPr lang="pl-PL" altLang="en-US"/>
-          </a:p>
-          <a:p>
-            <a:r>
-              <a:rPr lang="pl-PL" altLang="en-US"/>
-              <a:t>2) Przykłady optymalizacji</a:t>
-            </a:r>
-            <a:endParaRPr lang="pl-PL" altLang="en-US" sz="2800"/>
-          </a:p>
-          <a:p>
-            <a:pPr lvl="1"/>
-            <a:r>
-              <a:rPr lang="pl-PL" altLang="en-US" sz="2800">
-                <a:sym typeface="+mn-ea"/>
-              </a:rPr>
-              <a:t>Algorytm plecakowy:</a:t>
-            </a:r>
-            <a:endParaRPr lang="pl-PL" altLang="en-US" sz="2800"/>
-          </a:p>
-          <a:p>
-            <a:pPr lvl="2"/>
-            <a:r>
-              <a:rPr lang="pl-PL" altLang="en-US" sz="2800">
-                <a:sym typeface="+mn-ea"/>
-              </a:rPr>
-              <a:t>rekurencyjnie</a:t>
-            </a:r>
-            <a:endParaRPr lang="pl-PL" altLang="en-US" sz="2800"/>
-          </a:p>
-          <a:p>
-            <a:pPr lvl="2"/>
-            <a:r>
-              <a:rPr lang="pl-PL" altLang="en-US" sz="2800">
-                <a:sym typeface="+mn-ea"/>
-              </a:rPr>
-              <a:t>z wykorzystaniem programowania zachłannego</a:t>
-            </a:r>
-            <a:endParaRPr lang="pl-PL" altLang="en-US" sz="2800"/>
-          </a:p>
-          <a:p>
-            <a:pPr lvl="2"/>
-            <a:r>
-              <a:rPr lang="pl-PL" altLang="en-US" sz="2800">
-                <a:sym typeface="+mn-ea"/>
-              </a:rPr>
-              <a:t>z wykorzystaniem programowania dynamicznego</a:t>
-            </a:r>
-            <a:endParaRPr lang="pl-PL" altLang="en-US" sz="2800"/>
-          </a:p>
-          <a:p>
-            <a:pPr lvl="1"/>
-            <a:r>
-              <a:rPr lang="pl-PL" altLang="en-US" sz="2800">
-                <a:sym typeface="+mn-ea"/>
-              </a:rPr>
-              <a:t>Algorytm przetwarzania jednego stringa w drugi z wykorzystaniem 3 operacji</a:t>
-            </a:r>
-            <a:endParaRPr lang="pl-PL" altLang="en-US" sz="2800"/>
-          </a:p>
-          <a:p>
-            <a:pPr lvl="1"/>
-            <a:r>
-              <a:rPr lang="pl-PL" altLang="en-US" sz="2800">
-                <a:sym typeface="+mn-ea"/>
-              </a:rPr>
-              <a:t>Algorytm wydawania reszty</a:t>
-            </a:r>
-            <a:endParaRPr lang="pl-PL" altLang="en-US" sz="2800"/>
-          </a:p>
-          <a:p>
-            <a:pPr lvl="1"/>
-            <a:r>
-              <a:rPr lang="pl-PL" altLang="en-US" sz="2800">
-                <a:sym typeface="+mn-ea"/>
-              </a:rPr>
-              <a:t>wyszukiwanie z wartownikiem</a:t>
-            </a:r>
-            <a:endParaRPr lang="pl-PL" altLang="en-US"/>
-          </a:p>
-          <a:p>
-            <a:r>
-              <a:rPr lang="pl-PL" altLang="en-US"/>
-              <a:t>3) Przykłady z Życia</a:t>
-            </a:r>
-            <a:endParaRPr lang="pl-PL" altLang="en-US"/>
-          </a:p>
-        </p:txBody>
-      </p:sp>
-    </p:spTree>
-  </p:cSld>
-  <p:clrMapOvr>
-    <a:masterClrMapping/>
-  </p:clrMapOvr>
-</p:sld>
-</file>
-
-<file path=ppt/slides/slide20.xml><?xml version="1.0" encoding="utf-8"?>
+<file path=ppt/slides/slide19.xml><?xml version="1.0" encoding="utf-8"?>
 <p:sld xmlns:a="http://schemas.openxmlformats.org/drawingml/2006/main" xmlns:r="http://schemas.openxmlformats.org/officeDocument/2006/relationships" xmlns:p="http://schemas.openxmlformats.org/presentationml/2006/main">
   <p:cSld>
     <p:spTree>
@@ -8960,7 +8748,7 @@
 </p:sld>
 </file>
 
-<file path=ppt/slides/slide21.xml><?xml version="1.0" encoding="utf-8"?>
+<file path=ppt/slides/slide2.xml><?xml version="1.0" encoding="utf-8"?>
 <p:sld xmlns:a="http://schemas.openxmlformats.org/drawingml/2006/main" xmlns:r="http://schemas.openxmlformats.org/officeDocument/2006/relationships" xmlns:p="http://schemas.openxmlformats.org/presentationml/2006/main">
   <p:cSld>
     <p:spTree>
@@ -8986,6 +8774,154 @@
           <a:p>
             <a:r>
               <a:rPr lang="pl-PL" altLang="en-US"/>
+              <a:t>Spis Treści</a:t>
+            </a:r>
+            <a:endParaRPr lang="pl-PL" altLang="en-US"/>
+          </a:p>
+        </p:txBody>
+      </p:sp>
+      <p:sp>
+        <p:nvSpPr>
+          <p:cNvPr id="3" name="Content Placeholder 2"/>
+          <p:cNvSpPr>
+            <a:spLocks noGrp="1"/>
+          </p:cNvSpPr>
+          <p:nvPr>
+            <p:ph idx="1"/>
+          </p:nvPr>
+        </p:nvSpPr>
+        <p:spPr/>
+        <p:txBody>
+          <a:bodyPr>
+            <a:normAutofit fontScale="90000" lnSpcReduction="10000"/>
+          </a:bodyPr>
+          <a:p>
+            <a:r>
+              <a:rPr lang="pl-PL" altLang="en-US"/>
+              <a:t>1) Wstęp</a:t>
+            </a:r>
+            <a:endParaRPr lang="pl-PL" altLang="en-US"/>
+          </a:p>
+          <a:p>
+            <a:r>
+              <a:rPr lang="pl-PL" altLang="en-US"/>
+              <a:t>2) Przykłady optymalizacji</a:t>
+            </a:r>
+            <a:endParaRPr lang="pl-PL" altLang="en-US" sz="2800"/>
+          </a:p>
+          <a:p>
+            <a:pPr lvl="1"/>
+            <a:r>
+              <a:rPr lang="pl-PL" altLang="en-US" sz="2800">
+                <a:sym typeface="+mn-ea"/>
+              </a:rPr>
+              <a:t>Algorytm plecakowy:</a:t>
+            </a:r>
+            <a:endParaRPr lang="pl-PL" altLang="en-US" sz="2800"/>
+          </a:p>
+          <a:p>
+            <a:pPr lvl="2"/>
+            <a:r>
+              <a:rPr lang="pl-PL" altLang="en-US" sz="2800">
+                <a:sym typeface="+mn-ea"/>
+              </a:rPr>
+              <a:t>rekurencyjnie</a:t>
+            </a:r>
+            <a:endParaRPr lang="pl-PL" altLang="en-US" sz="2800"/>
+          </a:p>
+          <a:p>
+            <a:pPr lvl="2"/>
+            <a:r>
+              <a:rPr lang="pl-PL" altLang="en-US" sz="2800">
+                <a:sym typeface="+mn-ea"/>
+              </a:rPr>
+              <a:t>z wykorzystaniem programowania zachłannego</a:t>
+            </a:r>
+            <a:endParaRPr lang="pl-PL" altLang="en-US" sz="2800"/>
+          </a:p>
+          <a:p>
+            <a:pPr lvl="2"/>
+            <a:r>
+              <a:rPr lang="pl-PL" altLang="en-US" sz="2800">
+                <a:sym typeface="+mn-ea"/>
+              </a:rPr>
+              <a:t>z wykorzystaniem programowania dynamicznego</a:t>
+            </a:r>
+            <a:endParaRPr lang="pl-PL" altLang="en-US" sz="2800"/>
+          </a:p>
+          <a:p>
+            <a:pPr lvl="1"/>
+            <a:r>
+              <a:rPr lang="pl-PL" altLang="en-US" sz="2800">
+                <a:sym typeface="+mn-ea"/>
+              </a:rPr>
+              <a:t>Algorytm przetwarzania jednego stringa w drugi z wykorzystaniem 3 operacji</a:t>
+            </a:r>
+            <a:endParaRPr lang="pl-PL" altLang="en-US" sz="2800"/>
+          </a:p>
+          <a:p>
+            <a:pPr lvl="1"/>
+            <a:r>
+              <a:rPr lang="pl-PL" altLang="en-US" sz="2800">
+                <a:sym typeface="+mn-ea"/>
+              </a:rPr>
+              <a:t>Algorytm wydawania reszty</a:t>
+            </a:r>
+            <a:endParaRPr lang="pl-PL" altLang="en-US" sz="2800"/>
+          </a:p>
+          <a:p>
+            <a:pPr lvl="1"/>
+            <a:r>
+              <a:rPr lang="pl-PL" altLang="en-US" sz="2800">
+                <a:sym typeface="+mn-ea"/>
+              </a:rPr>
+              <a:t>wyszukiwanie z wartownikiem</a:t>
+            </a:r>
+            <a:endParaRPr lang="pl-PL" altLang="en-US"/>
+          </a:p>
+          <a:p>
+            <a:r>
+              <a:rPr lang="pl-PL" altLang="en-US"/>
+              <a:t>3) Przykłady z Życia</a:t>
+            </a:r>
+            <a:endParaRPr lang="pl-PL" altLang="en-US"/>
+          </a:p>
+        </p:txBody>
+      </p:sp>
+    </p:spTree>
+  </p:cSld>
+  <p:clrMapOvr>
+    <a:masterClrMapping/>
+  </p:clrMapOvr>
+</p:sld>
+</file>
+
+<file path=ppt/slides/slide20.xml><?xml version="1.0" encoding="utf-8"?>
+<p:sld xmlns:a="http://schemas.openxmlformats.org/drawingml/2006/main" xmlns:r="http://schemas.openxmlformats.org/officeDocument/2006/relationships" xmlns:p="http://schemas.openxmlformats.org/presentationml/2006/main">
+  <p:cSld>
+    <p:spTree>
+      <p:nvGrpSpPr>
+        <p:cNvPr id="1" name=""/>
+        <p:cNvGrpSpPr/>
+        <p:nvPr/>
+      </p:nvGrpSpPr>
+      <p:grpSpPr/>
+      <p:sp>
+        <p:nvSpPr>
+          <p:cNvPr id="2" name="Title 1"/>
+          <p:cNvSpPr>
+            <a:spLocks noGrp="1"/>
+          </p:cNvSpPr>
+          <p:nvPr>
+            <p:ph type="title"/>
+          </p:nvPr>
+        </p:nvSpPr>
+        <p:spPr/>
+        <p:txBody>
+          <a:bodyPr/>
+          <a:p>
+            <a:r>
+              <a:rPr lang="pl-PL" altLang="en-US"/>
               <a:t>Opis uzupełniania tabeli</a:t>
             </a:r>
             <a:endParaRPr lang="pl-PL" altLang="en-US"/>
@@ -9032,7 +8968,1742 @@
 </p:sld>
 </file>
 
+<file path=ppt/slides/slide21.xml><?xml version="1.0" encoding="utf-8"?>
+<p:sld xmlns:a="http://schemas.openxmlformats.org/drawingml/2006/main" xmlns:r="http://schemas.openxmlformats.org/officeDocument/2006/relationships" xmlns:p="http://schemas.openxmlformats.org/presentationml/2006/main">
+  <p:cSld>
+    <p:spTree>
+      <p:nvGrpSpPr>
+        <p:cNvPr id="1" name=""/>
+        <p:cNvGrpSpPr/>
+        <p:nvPr/>
+      </p:nvGrpSpPr>
+      <p:grpSpPr/>
+      <p:sp>
+        <p:nvSpPr>
+          <p:cNvPr id="4" name="Title 3"/>
+          <p:cNvSpPr>
+            <a:spLocks noGrp="1"/>
+          </p:cNvSpPr>
+          <p:nvPr>
+            <p:ph type="title"/>
+          </p:nvPr>
+        </p:nvSpPr>
+        <p:spPr/>
+        <p:txBody>
+          <a:bodyPr/>
+          <a:p>
+            <a:r>
+              <a:rPr lang="pl-PL" altLang="en-US">
+                <a:ln w="22225">
+                  <a:solidFill>
+                    <a:schemeClr val="accent2"/>
+                  </a:solidFill>
+                  <a:prstDash val="solid"/>
+                </a:ln>
+                <a:solidFill>
+                  <a:schemeClr val="accent2">
+                    <a:lumMod val="40000"/>
+                    <a:lumOff val="60000"/>
+                  </a:schemeClr>
+                </a:solidFill>
+                <a:effectLst/>
+              </a:rPr>
+              <a:t>WYSZUKIWANIE Z WARTOWNIKIEM</a:t>
+            </a:r>
+            <a:endParaRPr lang="pl-PL" altLang="en-US">
+              <a:ln w="22225">
+                <a:solidFill>
+                  <a:schemeClr val="accent2"/>
+                </a:solidFill>
+                <a:prstDash val="solid"/>
+              </a:ln>
+              <a:solidFill>
+                <a:schemeClr val="accent2">
+                  <a:lumMod val="40000"/>
+                  <a:lumOff val="60000"/>
+                </a:schemeClr>
+              </a:solidFill>
+              <a:effectLst/>
+            </a:endParaRPr>
+          </a:p>
+        </p:txBody>
+      </p:sp>
+    </p:spTree>
+  </p:cSld>
+  <p:clrMapOvr>
+    <a:masterClrMapping/>
+  </p:clrMapOvr>
+</p:sld>
+</file>
+
 <file path=ppt/slides/slide22.xml><?xml version="1.0" encoding="utf-8"?>
+<p:sld xmlns:a="http://schemas.openxmlformats.org/drawingml/2006/main" xmlns:r="http://schemas.openxmlformats.org/officeDocument/2006/relationships" xmlns:p="http://schemas.openxmlformats.org/presentationml/2006/main">
+  <p:cSld>
+    <p:spTree>
+      <p:nvGrpSpPr>
+        <p:cNvPr id="1" name=""/>
+        <p:cNvGrpSpPr/>
+        <p:nvPr/>
+      </p:nvGrpSpPr>
+      <p:grpSpPr/>
+      <p:sp>
+        <p:nvSpPr>
+          <p:cNvPr id="4" name="Title 3"/>
+          <p:cNvSpPr>
+            <a:spLocks noGrp="1"/>
+          </p:cNvSpPr>
+          <p:nvPr>
+            <p:ph type="title"/>
+          </p:nvPr>
+        </p:nvSpPr>
+        <p:spPr/>
+        <p:txBody>
+          <a:bodyPr/>
+          <a:p>
+            <a:r>
+              <a:rPr lang="pl-PL" altLang="en-US"/>
+              <a:t>Wyszukiwanie Zwykłe</a:t>
+            </a:r>
+            <a:endParaRPr lang="pl-PL" altLang="en-US"/>
+          </a:p>
+        </p:txBody>
+      </p:sp>
+      <p:sp>
+        <p:nvSpPr>
+          <p:cNvPr id="5" name="Content Placeholder 4"/>
+          <p:cNvSpPr>
+            <a:spLocks noGrp="1"/>
+          </p:cNvSpPr>
+          <p:nvPr>
+            <p:ph idx="1"/>
+          </p:nvPr>
+        </p:nvSpPr>
+        <p:spPr/>
+        <p:txBody>
+          <a:bodyPr/>
+          <a:p>
+            <a:r>
+              <a:rPr lang="pl-PL" altLang="en-US"/>
+              <a:t>Zeby znaleść szukany element w tablicy, napisalibyśby zapewne taki algorytm:</a:t>
+            </a:r>
+            <a:br>
+              <a:rPr lang="pl-PL" altLang="en-US"/>
+            </a:br>
+            <a:br>
+              <a:rPr lang="pl-PL" altLang="en-US"/>
+            </a:br>
+            <a:r>
+              <a:rPr lang="pl-PL" altLang="en-US"/>
+              <a:t>int getIndex(int szukanyEl)</a:t>
+            </a:r>
+            <a:endParaRPr lang="pl-PL" altLang="en-US"/>
+          </a:p>
+          <a:p>
+            <a:r>
+              <a:rPr lang="pl-PL" altLang="en-US"/>
+              <a:t>{</a:t>
+            </a:r>
+            <a:endParaRPr lang="pl-PL" altLang="en-US"/>
+          </a:p>
+          <a:p>
+            <a:pPr lvl="2"/>
+            <a:r>
+              <a:rPr lang="pl-PL" altLang="en-US"/>
+              <a:t>for(int i = 0; i &lt; tab.size(); i++)</a:t>
+            </a:r>
+            <a:endParaRPr lang="pl-PL" altLang="en-US"/>
+          </a:p>
+          <a:p>
+            <a:pPr marL="1371600" lvl="3" indent="0">
+              <a:buNone/>
+            </a:pPr>
+            <a:r>
+              <a:rPr lang="pl-PL" altLang="en-US" sz="2000"/>
+              <a:t>	if( tab[i] == szukenyEl)</a:t>
+            </a:r>
+            <a:endParaRPr lang="pl-PL" altLang="en-US" sz="2000"/>
+          </a:p>
+          <a:p>
+            <a:pPr marL="1371600" lvl="3" indent="0">
+              <a:buNone/>
+            </a:pPr>
+            <a:r>
+              <a:rPr lang="pl-PL" altLang="en-US" sz="2000"/>
+              <a:t>		return i;</a:t>
+            </a:r>
+            <a:endParaRPr lang="pl-PL" altLang="en-US" sz="2000"/>
+          </a:p>
+          <a:p>
+            <a:endParaRPr lang="pl-PL" altLang="en-US"/>
+          </a:p>
+          <a:p>
+            <a:pPr lvl="2"/>
+            <a:r>
+              <a:rPr lang="pl-PL" altLang="en-US"/>
+              <a:t>return -1;</a:t>
+            </a:r>
+            <a:endParaRPr lang="pl-PL" altLang="en-US"/>
+          </a:p>
+          <a:p>
+            <a:r>
+              <a:rPr lang="pl-PL" altLang="en-US"/>
+              <a:t>}</a:t>
+            </a:r>
+            <a:endParaRPr lang="pl-PL" altLang="en-US"/>
+          </a:p>
+        </p:txBody>
+      </p:sp>
+    </p:spTree>
+  </p:cSld>
+  <p:clrMapOvr>
+    <a:masterClrMapping/>
+  </p:clrMapOvr>
+</p:sld>
+</file>
+
+<file path=ppt/slides/slide23.xml><?xml version="1.0" encoding="utf-8"?>
+<p:sld xmlns:a="http://schemas.openxmlformats.org/drawingml/2006/main" xmlns:r="http://schemas.openxmlformats.org/officeDocument/2006/relationships" xmlns:p="http://schemas.openxmlformats.org/presentationml/2006/main">
+  <p:cSld>
+    <p:spTree>
+      <p:nvGrpSpPr>
+        <p:cNvPr id="1" name=""/>
+        <p:cNvGrpSpPr/>
+        <p:nvPr/>
+      </p:nvGrpSpPr>
+      <p:grpSpPr/>
+      <p:sp>
+        <p:nvSpPr>
+          <p:cNvPr id="2" name="Title 1"/>
+          <p:cNvSpPr>
+            <a:spLocks noGrp="1"/>
+          </p:cNvSpPr>
+          <p:nvPr>
+            <p:ph type="title"/>
+          </p:nvPr>
+        </p:nvSpPr>
+        <p:spPr/>
+        <p:txBody>
+          <a:bodyPr/>
+          <a:p>
+            <a:r>
+              <a:rPr lang="pl-PL" altLang="en-US"/>
+              <a:t>Analiza</a:t>
+            </a:r>
+            <a:endParaRPr lang="pl-PL" altLang="en-US"/>
+          </a:p>
+        </p:txBody>
+      </p:sp>
+      <p:sp>
+        <p:nvSpPr>
+          <p:cNvPr id="3" name="Content Placeholder 2"/>
+          <p:cNvSpPr>
+            <a:spLocks noGrp="1"/>
+          </p:cNvSpPr>
+          <p:nvPr>
+            <p:ph idx="1"/>
+          </p:nvPr>
+        </p:nvSpPr>
+        <p:spPr/>
+        <p:txBody>
+          <a:bodyPr/>
+          <a:p>
+            <a:r>
+              <a:rPr lang="pl-PL" altLang="en-US"/>
+              <a:t>Po przeanalizowaniu kodu widać, że z każdym elementem w pętli for wykonujemy dwa warunki sprawdzające:</a:t>
+            </a:r>
+            <a:br>
+              <a:rPr lang="pl-PL" altLang="en-US"/>
+            </a:br>
+            <a:br>
+              <a:rPr lang="pl-PL" altLang="en-US"/>
+            </a:br>
+            <a:r>
+              <a:rPr lang="pl-PL" altLang="en-US"/>
+              <a:t>1) Czy nie wyszliśmy poza talicę</a:t>
+            </a:r>
+            <a:endParaRPr lang="pl-PL" altLang="en-US"/>
+          </a:p>
+          <a:p>
+            <a:r>
+              <a:rPr lang="pl-PL" altLang="en-US"/>
+              <a:t>2) Czy sprawdzany element jest równy szukanemu</a:t>
+            </a:r>
+            <a:endParaRPr lang="pl-PL" altLang="en-US"/>
+          </a:p>
+        </p:txBody>
+      </p:sp>
+    </p:spTree>
+  </p:cSld>
+  <p:clrMapOvr>
+    <a:masterClrMapping/>
+  </p:clrMapOvr>
+</p:sld>
+</file>
+
+<file path=ppt/slides/slide24.xml><?xml version="1.0" encoding="utf-8"?>
+<p:sld xmlns:a="http://schemas.openxmlformats.org/drawingml/2006/main" xmlns:r="http://schemas.openxmlformats.org/officeDocument/2006/relationships" xmlns:p="http://schemas.openxmlformats.org/presentationml/2006/main">
+  <p:cSld>
+    <p:spTree>
+      <p:nvGrpSpPr>
+        <p:cNvPr id="1" name=""/>
+        <p:cNvGrpSpPr/>
+        <p:nvPr/>
+      </p:nvGrpSpPr>
+      <p:grpSpPr/>
+      <p:sp>
+        <p:nvSpPr>
+          <p:cNvPr id="2" name="Title 1"/>
+          <p:cNvSpPr>
+            <a:spLocks noGrp="1"/>
+          </p:cNvSpPr>
+          <p:nvPr>
+            <p:ph type="title"/>
+          </p:nvPr>
+        </p:nvSpPr>
+        <p:spPr/>
+        <p:txBody>
+          <a:bodyPr/>
+          <a:p>
+            <a:r>
+              <a:rPr lang="pl-PL" altLang="en-US"/>
+              <a:t>Wyszukiwanie  z wartownikiem</a:t>
+            </a:r>
+            <a:endParaRPr lang="pl-PL" altLang="en-US"/>
+          </a:p>
+        </p:txBody>
+      </p:sp>
+      <p:sp>
+        <p:nvSpPr>
+          <p:cNvPr id="3" name="Content Placeholder 2"/>
+          <p:cNvSpPr>
+            <a:spLocks noGrp="1"/>
+          </p:cNvSpPr>
+          <p:nvPr>
+            <p:ph idx="1"/>
+          </p:nvPr>
+        </p:nvSpPr>
+        <p:spPr/>
+        <p:txBody>
+          <a:bodyPr/>
+          <a:p>
+            <a:r>
+              <a:rPr lang="pl-PL" altLang="en-US"/>
+              <a:t>Jeśli powiększymy naszą przeszukiwaną tablicę o 1.</a:t>
+            </a:r>
+            <a:br>
+              <a:rPr lang="pl-PL" altLang="en-US"/>
+            </a:br>
+            <a:r>
+              <a:rPr lang="pl-PL" altLang="en-US"/>
+              <a:t>Na jej dodatkowym elemencie wstawiając szukany element wykonujemy tylko 1 ifa sprawdzającego czy nasz obecny element jest równy szukanemu.</a:t>
+            </a:r>
+            <a:endParaRPr lang="pl-PL" altLang="en-US"/>
+          </a:p>
+          <a:p>
+            <a:endParaRPr lang="pl-PL" altLang="en-US"/>
+          </a:p>
+          <a:p>
+            <a:r>
+              <a:rPr lang="pl-PL" altLang="en-US"/>
+              <a:t>Jeśli element nie istnieje algorytm zwróci wartość ostatniego indeksu w tablicy.</a:t>
+            </a:r>
+            <a:endParaRPr lang="pl-PL" altLang="en-US"/>
+          </a:p>
+        </p:txBody>
+      </p:sp>
+    </p:spTree>
+  </p:cSld>
+  <p:clrMapOvr>
+    <a:masterClrMapping/>
+  </p:clrMapOvr>
+</p:sld>
+</file>
+
+<file path=ppt/slides/slide25.xml><?xml version="1.0" encoding="utf-8"?>
+<p:sld xmlns:a="http://schemas.openxmlformats.org/drawingml/2006/main" xmlns:r="http://schemas.openxmlformats.org/officeDocument/2006/relationships" xmlns:p="http://schemas.openxmlformats.org/presentationml/2006/main">
+  <p:cSld>
+    <p:spTree>
+      <p:nvGrpSpPr>
+        <p:cNvPr id="1" name=""/>
+        <p:cNvGrpSpPr/>
+        <p:nvPr/>
+      </p:nvGrpSpPr>
+      <p:grpSpPr/>
+      <p:sp>
+        <p:nvSpPr>
+          <p:cNvPr id="2" name="Title 1"/>
+          <p:cNvSpPr>
+            <a:spLocks noGrp="1"/>
+          </p:cNvSpPr>
+          <p:nvPr>
+            <p:ph type="title"/>
+          </p:nvPr>
+        </p:nvSpPr>
+        <p:spPr/>
+        <p:txBody>
+          <a:bodyPr/>
+          <a:p>
+            <a:r>
+              <a:rPr lang="pl-PL" altLang="en-US">
+                <a:sym typeface="+mn-ea"/>
+              </a:rPr>
+              <a:t>Przykłady</a:t>
+            </a:r>
+            <a:endParaRPr lang="en-US"/>
+          </a:p>
+        </p:txBody>
+      </p:sp>
+      <p:sp>
+        <p:nvSpPr>
+          <p:cNvPr id="3" name="Content Placeholder 2"/>
+          <p:cNvSpPr>
+            <a:spLocks noGrp="1"/>
+          </p:cNvSpPr>
+          <p:nvPr>
+            <p:ph sz="half" idx="1"/>
+          </p:nvPr>
+        </p:nvSpPr>
+        <p:spPr>
+          <a:xfrm>
+            <a:off x="288290" y="1207135"/>
+            <a:ext cx="10974705" cy="4953000"/>
+          </a:xfrm>
+        </p:spPr>
+        <p:txBody>
+          <a:bodyPr/>
+          <a:p>
+            <a:r>
+              <a:rPr lang="pl-PL" altLang="en-US">
+                <a:sym typeface="+mn-ea"/>
+              </a:rPr>
+              <a:t>Szukana wartość: 5</a:t>
+            </a:r>
+            <a:endParaRPr lang="pl-PL" altLang="en-US"/>
+          </a:p>
+          <a:p>
+            <a:endParaRPr lang="pl-PL" altLang="en-US"/>
+          </a:p>
+          <a:p>
+            <a:endParaRPr lang="pl-PL" altLang="en-US"/>
+          </a:p>
+          <a:p>
+            <a:r>
+              <a:rPr lang="pl-PL" altLang="en-US">
+                <a:sym typeface="+mn-ea"/>
+              </a:rPr>
+              <a:t>Po zastosowaniu algorytmu</a:t>
+            </a:r>
+            <a:endParaRPr lang="pl-PL" altLang="en-US"/>
+          </a:p>
+          <a:p>
+            <a:endParaRPr lang="pl-PL" altLang="en-US"/>
+          </a:p>
+          <a:p>
+            <a:endParaRPr lang="pl-PL" altLang="en-US"/>
+          </a:p>
+          <a:p>
+            <a:r>
+              <a:rPr lang="pl-PL" altLang="en-US">
+                <a:sym typeface="+mn-ea"/>
+              </a:rPr>
+              <a:t>Wynik: 3</a:t>
+            </a:r>
+            <a:endParaRPr lang="pl-PL" altLang="en-US"/>
+          </a:p>
+          <a:p>
+            <a:endParaRPr lang="en-US"/>
+          </a:p>
+        </p:txBody>
+      </p:sp>
+      <p:graphicFrame>
+        <p:nvGraphicFramePr>
+          <p:cNvPr id="5" name="Content Placeholder 4"/>
+          <p:cNvGraphicFramePr/>
+          <p:nvPr>
+            <p:ph sz="half" idx="2"/>
+          </p:nvPr>
+        </p:nvGraphicFramePr>
+        <p:xfrm>
+          <a:off x="1668780" y="2009775"/>
+          <a:ext cx="7343140" cy="762000"/>
+        </p:xfrm>
+        <a:graphic>
+          <a:graphicData uri="http://schemas.openxmlformats.org/drawingml/2006/table">
+            <a:tbl>
+              <a:tblPr firstRow="1" bandRow="1">
+                <a:tableStyleId>{5C22544A-7EE6-4342-B048-85BDC9FD1C3A}</a:tableStyleId>
+              </a:tblPr>
+              <a:tblGrid>
+                <a:gridCol w="1049020"/>
+                <a:gridCol w="1049020"/>
+                <a:gridCol w="1049020"/>
+                <a:gridCol w="1049020"/>
+                <a:gridCol w="1049020"/>
+                <a:gridCol w="1049020"/>
+                <a:gridCol w="1049020"/>
+              </a:tblGrid>
+              <a:tr h="381000">
+                <a:tc>
+                  <a:txBody>
+                    <a:bodyPr/>
+                    <a:p>
+                      <a:pPr>
+                        <a:buNone/>
+                      </a:pPr>
+                      <a:r>
+                        <a:rPr lang="pl-PL" altLang="en-US"/>
+                        <a:t>indeksy</a:t>
+                      </a:r>
+                      <a:endParaRPr lang="pl-PL" altLang="en-US"/>
+                    </a:p>
+                  </a:txBody>
+                  <a:tcPr/>
+                </a:tc>
+                <a:tc>
+                  <a:txBody>
+                    <a:bodyPr/>
+                    <a:p>
+                      <a:pPr>
+                        <a:buNone/>
+                      </a:pPr>
+                      <a:r>
+                        <a:rPr lang="pl-PL" altLang="en-US"/>
+                        <a:t>0</a:t>
+                      </a:r>
+                      <a:endParaRPr lang="pl-PL" altLang="en-US"/>
+                    </a:p>
+                  </a:txBody>
+                  <a:tcPr/>
+                </a:tc>
+                <a:tc>
+                  <a:txBody>
+                    <a:bodyPr/>
+                    <a:p>
+                      <a:pPr>
+                        <a:buNone/>
+                      </a:pPr>
+                      <a:r>
+                        <a:rPr lang="pl-PL" altLang="en-US"/>
+                        <a:t>1</a:t>
+                      </a:r>
+                      <a:endParaRPr lang="pl-PL" altLang="en-US"/>
+                    </a:p>
+                  </a:txBody>
+                  <a:tcPr/>
+                </a:tc>
+                <a:tc>
+                  <a:txBody>
+                    <a:bodyPr/>
+                    <a:p>
+                      <a:pPr>
+                        <a:buNone/>
+                      </a:pPr>
+                      <a:r>
+                        <a:rPr lang="pl-PL" altLang="en-US"/>
+                        <a:t>2</a:t>
+                      </a:r>
+                      <a:endParaRPr lang="pl-PL" altLang="en-US"/>
+                    </a:p>
+                  </a:txBody>
+                  <a:tcPr/>
+                </a:tc>
+                <a:tc>
+                  <a:txBody>
+                    <a:bodyPr/>
+                    <a:p>
+                      <a:pPr>
+                        <a:buNone/>
+                      </a:pPr>
+                      <a:r>
+                        <a:rPr lang="pl-PL" altLang="en-US"/>
+                        <a:t>3</a:t>
+                      </a:r>
+                      <a:endParaRPr lang="pl-PL" altLang="en-US"/>
+                    </a:p>
+                  </a:txBody>
+                  <a:tcPr>
+                    <a:gradFill>
+                      <a:gsLst>
+                        <a:gs pos="0">
+                          <a:srgbClr val="FBFB11"/>
+                        </a:gs>
+                        <a:gs pos="100000">
+                          <a:srgbClr val="838309"/>
+                        </a:gs>
+                      </a:gsLst>
+                      <a:lin ang="5400000" scaled="0"/>
+                    </a:gradFill>
+                  </a:tcPr>
+                </a:tc>
+                <a:tc>
+                  <a:txBody>
+                    <a:bodyPr/>
+                    <a:p>
+                      <a:pPr>
+                        <a:buNone/>
+                      </a:pPr>
+                      <a:r>
+                        <a:rPr lang="pl-PL" altLang="en-US"/>
+                        <a:t>4</a:t>
+                      </a:r>
+                      <a:endParaRPr lang="pl-PL" altLang="en-US"/>
+                    </a:p>
+                  </a:txBody>
+                  <a:tcPr/>
+                </a:tc>
+                <a:tc>
+                  <a:txBody>
+                    <a:bodyPr/>
+                    <a:p>
+                      <a:pPr>
+                        <a:buNone/>
+                      </a:pPr>
+                      <a:r>
+                        <a:rPr lang="pl-PL" altLang="en-US"/>
+                        <a:t>5</a:t>
+                      </a:r>
+                      <a:endParaRPr lang="pl-PL" altLang="en-US"/>
+                    </a:p>
+                  </a:txBody>
+                  <a:tcPr/>
+                </a:tc>
+              </a:tr>
+              <a:tr h="381000">
+                <a:tc>
+                  <a:txBody>
+                    <a:bodyPr/>
+                    <a:p>
+                      <a:pPr>
+                        <a:buNone/>
+                      </a:pPr>
+                      <a:r>
+                        <a:rPr lang="pl-PL" altLang="en-US"/>
+                        <a:t>wartości</a:t>
+                      </a:r>
+                      <a:endParaRPr lang="pl-PL" altLang="en-US"/>
+                    </a:p>
+                  </a:txBody>
+                  <a:tcPr/>
+                </a:tc>
+                <a:tc>
+                  <a:txBody>
+                    <a:bodyPr/>
+                    <a:p>
+                      <a:pPr>
+                        <a:buNone/>
+                      </a:pPr>
+                      <a:r>
+                        <a:rPr lang="pl-PL" altLang="en-US"/>
+                        <a:t>3</a:t>
+                      </a:r>
+                      <a:endParaRPr lang="pl-PL" altLang="en-US"/>
+                    </a:p>
+                  </a:txBody>
+                  <a:tcPr/>
+                </a:tc>
+                <a:tc>
+                  <a:txBody>
+                    <a:bodyPr/>
+                    <a:p>
+                      <a:pPr>
+                        <a:buNone/>
+                      </a:pPr>
+                      <a:r>
+                        <a:rPr lang="pl-PL" altLang="en-US"/>
+                        <a:t>1</a:t>
+                      </a:r>
+                      <a:endParaRPr lang="pl-PL" altLang="en-US"/>
+                    </a:p>
+                  </a:txBody>
+                  <a:tcPr/>
+                </a:tc>
+                <a:tc>
+                  <a:txBody>
+                    <a:bodyPr/>
+                    <a:p>
+                      <a:pPr>
+                        <a:buNone/>
+                      </a:pPr>
+                      <a:r>
+                        <a:rPr lang="pl-PL" altLang="en-US"/>
+                        <a:t>4</a:t>
+                      </a:r>
+                      <a:endParaRPr lang="pl-PL" altLang="en-US"/>
+                    </a:p>
+                  </a:txBody>
+                  <a:tcPr/>
+                </a:tc>
+                <a:tc>
+                  <a:txBody>
+                    <a:bodyPr/>
+                    <a:p>
+                      <a:pPr>
+                        <a:buNone/>
+                      </a:pPr>
+                      <a:r>
+                        <a:rPr lang="pl-PL" altLang="en-US"/>
+                        <a:t>5</a:t>
+                      </a:r>
+                      <a:endParaRPr lang="pl-PL" altLang="en-US"/>
+                    </a:p>
+                  </a:txBody>
+                  <a:tcPr>
+                    <a:gradFill>
+                      <a:gsLst>
+                        <a:gs pos="0">
+                          <a:srgbClr val="FBFB11"/>
+                        </a:gs>
+                        <a:gs pos="100000">
+                          <a:srgbClr val="838309"/>
+                        </a:gs>
+                      </a:gsLst>
+                      <a:lin ang="5400000" scaled="0"/>
+                    </a:gradFill>
+                  </a:tcPr>
+                </a:tc>
+                <a:tc>
+                  <a:txBody>
+                    <a:bodyPr/>
+                    <a:p>
+                      <a:pPr>
+                        <a:buNone/>
+                      </a:pPr>
+                      <a:r>
+                        <a:rPr lang="pl-PL" altLang="en-US"/>
+                        <a:t>2</a:t>
+                      </a:r>
+                      <a:endParaRPr lang="pl-PL" altLang="en-US"/>
+                    </a:p>
+                  </a:txBody>
+                  <a:tcPr/>
+                </a:tc>
+                <a:tc>
+                  <a:txBody>
+                    <a:bodyPr/>
+                    <a:p>
+                      <a:pPr>
+                        <a:buNone/>
+                      </a:pPr>
+                      <a:r>
+                        <a:rPr lang="pl-PL" altLang="en-US"/>
+                        <a:t>7</a:t>
+                      </a:r>
+                      <a:endParaRPr lang="pl-PL" altLang="en-US"/>
+                    </a:p>
+                  </a:txBody>
+                  <a:tcPr/>
+                </a:tc>
+              </a:tr>
+            </a:tbl>
+          </a:graphicData>
+        </a:graphic>
+      </p:graphicFrame>
+      <p:graphicFrame>
+        <p:nvGraphicFramePr>
+          <p:cNvPr id="6" name="Table 5"/>
+          <p:cNvGraphicFramePr/>
+          <p:nvPr/>
+        </p:nvGraphicFramePr>
+        <p:xfrm>
+          <a:off x="1668780" y="3883660"/>
+          <a:ext cx="9704705" cy="762000"/>
+        </p:xfrm>
+        <a:graphic>
+          <a:graphicData uri="http://schemas.openxmlformats.org/drawingml/2006/table">
+            <a:tbl>
+              <a:tblPr firstRow="1" bandRow="1">
+                <a:tableStyleId>{5C22544A-7EE6-4342-B048-85BDC9FD1C3A}</a:tableStyleId>
+              </a:tblPr>
+              <a:tblGrid>
+                <a:gridCol w="1212850"/>
+                <a:gridCol w="1213485"/>
+                <a:gridCol w="1212850"/>
+                <a:gridCol w="1213485"/>
+                <a:gridCol w="1212850"/>
+                <a:gridCol w="1212850"/>
+                <a:gridCol w="1213485"/>
+                <a:gridCol w="1212850"/>
+              </a:tblGrid>
+              <a:tr h="381000">
+                <a:tc>
+                  <a:txBody>
+                    <a:bodyPr/>
+                    <a:p>
+                      <a:pPr>
+                        <a:buNone/>
+                      </a:pPr>
+                      <a:r>
+                        <a:rPr lang="pl-PL" altLang="en-US"/>
+                        <a:t>indeksy</a:t>
+                      </a:r>
+                      <a:endParaRPr lang="pl-PL" altLang="en-US"/>
+                    </a:p>
+                  </a:txBody>
+                  <a:tcPr/>
+                </a:tc>
+                <a:tc>
+                  <a:txBody>
+                    <a:bodyPr/>
+                    <a:p>
+                      <a:pPr>
+                        <a:buNone/>
+                      </a:pPr>
+                      <a:r>
+                        <a:rPr lang="pl-PL" altLang="en-US"/>
+                        <a:t>0</a:t>
+                      </a:r>
+                      <a:endParaRPr lang="pl-PL" altLang="en-US"/>
+                    </a:p>
+                  </a:txBody>
+                  <a:tcPr/>
+                </a:tc>
+                <a:tc>
+                  <a:txBody>
+                    <a:bodyPr/>
+                    <a:p>
+                      <a:pPr>
+                        <a:buNone/>
+                      </a:pPr>
+                      <a:r>
+                        <a:rPr lang="pl-PL" altLang="en-US"/>
+                        <a:t>1</a:t>
+                      </a:r>
+                      <a:endParaRPr lang="pl-PL" altLang="en-US"/>
+                    </a:p>
+                  </a:txBody>
+                  <a:tcPr/>
+                </a:tc>
+                <a:tc>
+                  <a:txBody>
+                    <a:bodyPr/>
+                    <a:p>
+                      <a:pPr>
+                        <a:buNone/>
+                      </a:pPr>
+                      <a:r>
+                        <a:rPr lang="pl-PL" altLang="en-US"/>
+                        <a:t>2</a:t>
+                      </a:r>
+                      <a:endParaRPr lang="pl-PL" altLang="en-US"/>
+                    </a:p>
+                  </a:txBody>
+                  <a:tcPr/>
+                </a:tc>
+                <a:tc>
+                  <a:txBody>
+                    <a:bodyPr/>
+                    <a:p>
+                      <a:pPr>
+                        <a:buNone/>
+                      </a:pPr>
+                      <a:r>
+                        <a:rPr lang="pl-PL" altLang="en-US"/>
+                        <a:t>3</a:t>
+                      </a:r>
+                      <a:endParaRPr lang="pl-PL" altLang="en-US"/>
+                    </a:p>
+                  </a:txBody>
+                  <a:tcPr>
+                    <a:gradFill>
+                      <a:gsLst>
+                        <a:gs pos="0">
+                          <a:srgbClr val="FBFB11"/>
+                        </a:gs>
+                        <a:gs pos="100000">
+                          <a:srgbClr val="838309"/>
+                        </a:gs>
+                      </a:gsLst>
+                      <a:lin ang="5400000" scaled="0"/>
+                    </a:gradFill>
+                  </a:tcPr>
+                </a:tc>
+                <a:tc>
+                  <a:txBody>
+                    <a:bodyPr/>
+                    <a:p>
+                      <a:pPr>
+                        <a:buNone/>
+                      </a:pPr>
+                      <a:r>
+                        <a:rPr lang="pl-PL" altLang="en-US"/>
+                        <a:t>4</a:t>
+                      </a:r>
+                      <a:endParaRPr lang="pl-PL" altLang="en-US"/>
+                    </a:p>
+                  </a:txBody>
+                  <a:tcPr/>
+                </a:tc>
+                <a:tc>
+                  <a:txBody>
+                    <a:bodyPr/>
+                    <a:p>
+                      <a:pPr>
+                        <a:buNone/>
+                      </a:pPr>
+                      <a:r>
+                        <a:rPr lang="pl-PL" altLang="en-US"/>
+                        <a:t>5</a:t>
+                      </a:r>
+                      <a:endParaRPr lang="pl-PL" altLang="en-US"/>
+                    </a:p>
+                  </a:txBody>
+                  <a:tcPr/>
+                </a:tc>
+                <a:tc>
+                  <a:txBody>
+                    <a:bodyPr/>
+                    <a:p>
+                      <a:pPr>
+                        <a:buNone/>
+                      </a:pPr>
+                      <a:r>
+                        <a:rPr lang="pl-PL" altLang="en-US"/>
+                        <a:t>6</a:t>
+                      </a:r>
+                      <a:endParaRPr lang="pl-PL" altLang="en-US"/>
+                    </a:p>
+                  </a:txBody>
+                  <a:tcPr>
+                    <a:gradFill>
+                      <a:gsLst>
+                        <a:gs pos="0">
+                          <a:srgbClr val="007BD3"/>
+                        </a:gs>
+                        <a:gs pos="100000">
+                          <a:srgbClr val="034373"/>
+                        </a:gs>
+                      </a:gsLst>
+                      <a:lin ang="5400000" scaled="0"/>
+                    </a:gradFill>
+                  </a:tcPr>
+                </a:tc>
+              </a:tr>
+              <a:tr h="381000">
+                <a:tc>
+                  <a:txBody>
+                    <a:bodyPr/>
+                    <a:p>
+                      <a:pPr>
+                        <a:buNone/>
+                      </a:pPr>
+                      <a:r>
+                        <a:rPr lang="pl-PL" altLang="en-US"/>
+                        <a:t>wartości</a:t>
+                      </a:r>
+                      <a:endParaRPr lang="pl-PL" altLang="en-US"/>
+                    </a:p>
+                  </a:txBody>
+                  <a:tcPr/>
+                </a:tc>
+                <a:tc>
+                  <a:txBody>
+                    <a:bodyPr/>
+                    <a:p>
+                      <a:pPr>
+                        <a:buNone/>
+                      </a:pPr>
+                      <a:r>
+                        <a:rPr lang="pl-PL" altLang="en-US"/>
+                        <a:t>3</a:t>
+                      </a:r>
+                      <a:endParaRPr lang="pl-PL" altLang="en-US"/>
+                    </a:p>
+                  </a:txBody>
+                  <a:tcPr/>
+                </a:tc>
+                <a:tc>
+                  <a:txBody>
+                    <a:bodyPr/>
+                    <a:p>
+                      <a:pPr>
+                        <a:buNone/>
+                      </a:pPr>
+                      <a:r>
+                        <a:rPr lang="pl-PL" altLang="en-US"/>
+                        <a:t>1</a:t>
+                      </a:r>
+                      <a:endParaRPr lang="pl-PL" altLang="en-US"/>
+                    </a:p>
+                  </a:txBody>
+                  <a:tcPr/>
+                </a:tc>
+                <a:tc>
+                  <a:txBody>
+                    <a:bodyPr/>
+                    <a:p>
+                      <a:pPr>
+                        <a:buNone/>
+                      </a:pPr>
+                      <a:r>
+                        <a:rPr lang="pl-PL" altLang="en-US"/>
+                        <a:t>4</a:t>
+                      </a:r>
+                      <a:endParaRPr lang="pl-PL" altLang="en-US"/>
+                    </a:p>
+                  </a:txBody>
+                  <a:tcPr/>
+                </a:tc>
+                <a:tc>
+                  <a:txBody>
+                    <a:bodyPr/>
+                    <a:p>
+                      <a:pPr>
+                        <a:buNone/>
+                      </a:pPr>
+                      <a:r>
+                        <a:rPr lang="pl-PL" altLang="en-US"/>
+                        <a:t>5</a:t>
+                      </a:r>
+                      <a:endParaRPr lang="pl-PL" altLang="en-US"/>
+                    </a:p>
+                  </a:txBody>
+                  <a:tcPr>
+                    <a:gradFill>
+                      <a:gsLst>
+                        <a:gs pos="0">
+                          <a:srgbClr val="FBFB11"/>
+                        </a:gs>
+                        <a:gs pos="100000">
+                          <a:srgbClr val="838309"/>
+                        </a:gs>
+                      </a:gsLst>
+                      <a:lin ang="5400000" scaled="0"/>
+                    </a:gradFill>
+                  </a:tcPr>
+                </a:tc>
+                <a:tc>
+                  <a:txBody>
+                    <a:bodyPr/>
+                    <a:p>
+                      <a:pPr>
+                        <a:buNone/>
+                      </a:pPr>
+                      <a:r>
+                        <a:rPr lang="pl-PL" altLang="en-US"/>
+                        <a:t>2</a:t>
+                      </a:r>
+                      <a:endParaRPr lang="pl-PL" altLang="en-US"/>
+                    </a:p>
+                  </a:txBody>
+                  <a:tcPr/>
+                </a:tc>
+                <a:tc>
+                  <a:txBody>
+                    <a:bodyPr/>
+                    <a:p>
+                      <a:pPr>
+                        <a:buNone/>
+                      </a:pPr>
+                      <a:r>
+                        <a:rPr lang="pl-PL" altLang="en-US"/>
+                        <a:t>7</a:t>
+                      </a:r>
+                      <a:endParaRPr lang="pl-PL" altLang="en-US"/>
+                    </a:p>
+                  </a:txBody>
+                  <a:tcPr/>
+                </a:tc>
+                <a:tc>
+                  <a:txBody>
+                    <a:bodyPr/>
+                    <a:p>
+                      <a:pPr>
+                        <a:buNone/>
+                      </a:pPr>
+                      <a:r>
+                        <a:rPr lang="pl-PL" altLang="en-US"/>
+                        <a:t>5</a:t>
+                      </a:r>
+                      <a:endParaRPr lang="pl-PL" altLang="en-US"/>
+                    </a:p>
+                  </a:txBody>
+                  <a:tcPr>
+                    <a:gradFill>
+                      <a:gsLst>
+                        <a:gs pos="0">
+                          <a:srgbClr val="007BD3"/>
+                        </a:gs>
+                        <a:gs pos="100000">
+                          <a:srgbClr val="034373"/>
+                        </a:gs>
+                      </a:gsLst>
+                      <a:lin ang="5400000" scaled="0"/>
+                    </a:gradFill>
+                  </a:tcPr>
+                </a:tc>
+              </a:tr>
+            </a:tbl>
+          </a:graphicData>
+        </a:graphic>
+      </p:graphicFrame>
+    </p:spTree>
+  </p:cSld>
+  <p:clrMapOvr>
+    <a:masterClrMapping/>
+  </p:clrMapOvr>
+</p:sld>
+</file>
+
+<file path=ppt/slides/slide26.xml><?xml version="1.0" encoding="utf-8"?>
+<p:sld xmlns:a="http://schemas.openxmlformats.org/drawingml/2006/main" xmlns:r="http://schemas.openxmlformats.org/officeDocument/2006/relationships" xmlns:p="http://schemas.openxmlformats.org/presentationml/2006/main">
+  <p:cSld>
+    <p:spTree>
+      <p:nvGrpSpPr>
+        <p:cNvPr id="1" name=""/>
+        <p:cNvGrpSpPr/>
+        <p:nvPr/>
+      </p:nvGrpSpPr>
+      <p:grpSpPr/>
+      <p:sp>
+        <p:nvSpPr>
+          <p:cNvPr id="2" name="Title 1"/>
+          <p:cNvSpPr>
+            <a:spLocks noGrp="1"/>
+          </p:cNvSpPr>
+          <p:nvPr>
+            <p:ph type="title"/>
+          </p:nvPr>
+        </p:nvSpPr>
+        <p:spPr/>
+        <p:txBody>
+          <a:bodyPr/>
+          <a:p>
+            <a:r>
+              <a:rPr lang="pl-PL" altLang="en-US"/>
+              <a:t>Przykłady</a:t>
+            </a:r>
+            <a:endParaRPr lang="pl-PL" altLang="en-US"/>
+          </a:p>
+        </p:txBody>
+      </p:sp>
+      <p:sp>
+        <p:nvSpPr>
+          <p:cNvPr id="3" name="Content Placeholder 2"/>
+          <p:cNvSpPr>
+            <a:spLocks noGrp="1"/>
+          </p:cNvSpPr>
+          <p:nvPr>
+            <p:ph idx="1"/>
+          </p:nvPr>
+        </p:nvSpPr>
+        <p:spPr/>
+        <p:txBody>
+          <a:bodyPr/>
+          <a:p>
+            <a:r>
+              <a:rPr lang="pl-PL" altLang="en-US"/>
+              <a:t>Szukana wartość: 999</a:t>
+            </a:r>
+            <a:endParaRPr lang="pl-PL" altLang="en-US"/>
+          </a:p>
+          <a:p>
+            <a:endParaRPr lang="pl-PL" altLang="en-US"/>
+          </a:p>
+          <a:p>
+            <a:endParaRPr lang="pl-PL" altLang="en-US"/>
+          </a:p>
+          <a:p>
+            <a:r>
+              <a:rPr lang="pl-PL" altLang="en-US"/>
+              <a:t>Po modyfikacji</a:t>
+            </a:r>
+            <a:endParaRPr lang="pl-PL" altLang="en-US"/>
+          </a:p>
+          <a:p>
+            <a:endParaRPr lang="pl-PL" altLang="en-US"/>
+          </a:p>
+          <a:p>
+            <a:endParaRPr lang="pl-PL" altLang="en-US"/>
+          </a:p>
+          <a:p>
+            <a:r>
+              <a:rPr lang="pl-PL" altLang="en-US"/>
+              <a:t>Wynik: -1 (nie znaleziono)</a:t>
+            </a:r>
+            <a:endParaRPr lang="pl-PL" altLang="en-US"/>
+          </a:p>
+        </p:txBody>
+      </p:sp>
+      <p:graphicFrame>
+        <p:nvGraphicFramePr>
+          <p:cNvPr id="5" name="Table 4"/>
+          <p:cNvGraphicFramePr/>
+          <p:nvPr/>
+        </p:nvGraphicFramePr>
+        <p:xfrm>
+          <a:off x="1668780" y="2004060"/>
+          <a:ext cx="8533765" cy="762000"/>
+        </p:xfrm>
+        <a:graphic>
+          <a:graphicData uri="http://schemas.openxmlformats.org/drawingml/2006/table">
+            <a:tbl>
+              <a:tblPr firstRow="1" bandRow="1">
+                <a:tableStyleId>{5C22544A-7EE6-4342-B048-85BDC9FD1C3A}</a:tableStyleId>
+              </a:tblPr>
+              <a:tblGrid>
+                <a:gridCol w="1218565"/>
+                <a:gridCol w="1218565"/>
+                <a:gridCol w="1218565"/>
+                <a:gridCol w="1218565"/>
+                <a:gridCol w="1218565"/>
+                <a:gridCol w="1218565"/>
+                <a:gridCol w="1218565"/>
+              </a:tblGrid>
+              <a:tr h="381000">
+                <a:tc>
+                  <a:txBody>
+                    <a:bodyPr/>
+                    <a:p>
+                      <a:pPr>
+                        <a:buNone/>
+                      </a:pPr>
+                      <a:r>
+                        <a:rPr lang="pl-PL" altLang="en-US"/>
+                        <a:t>indeksy</a:t>
+                      </a:r>
+                      <a:endParaRPr lang="pl-PL" altLang="en-US"/>
+                    </a:p>
+                  </a:txBody>
+                  <a:tcPr/>
+                </a:tc>
+                <a:tc>
+                  <a:txBody>
+                    <a:bodyPr/>
+                    <a:p>
+                      <a:pPr>
+                        <a:buNone/>
+                      </a:pPr>
+                      <a:r>
+                        <a:rPr lang="pl-PL" altLang="en-US"/>
+                        <a:t>0</a:t>
+                      </a:r>
+                      <a:endParaRPr lang="pl-PL" altLang="en-US"/>
+                    </a:p>
+                  </a:txBody>
+                  <a:tcPr/>
+                </a:tc>
+                <a:tc>
+                  <a:txBody>
+                    <a:bodyPr/>
+                    <a:p>
+                      <a:pPr>
+                        <a:buNone/>
+                      </a:pPr>
+                      <a:r>
+                        <a:rPr lang="pl-PL" altLang="en-US"/>
+                        <a:t>1</a:t>
+                      </a:r>
+                      <a:endParaRPr lang="pl-PL" altLang="en-US"/>
+                    </a:p>
+                  </a:txBody>
+                  <a:tcPr/>
+                </a:tc>
+                <a:tc>
+                  <a:txBody>
+                    <a:bodyPr/>
+                    <a:p>
+                      <a:pPr>
+                        <a:buNone/>
+                      </a:pPr>
+                      <a:r>
+                        <a:rPr lang="pl-PL" altLang="en-US"/>
+                        <a:t>2</a:t>
+                      </a:r>
+                      <a:endParaRPr lang="pl-PL" altLang="en-US"/>
+                    </a:p>
+                  </a:txBody>
+                  <a:tcPr/>
+                </a:tc>
+                <a:tc>
+                  <a:txBody>
+                    <a:bodyPr/>
+                    <a:p>
+                      <a:pPr>
+                        <a:buNone/>
+                      </a:pPr>
+                      <a:r>
+                        <a:rPr lang="pl-PL" altLang="en-US"/>
+                        <a:t>3</a:t>
+                      </a:r>
+                      <a:endParaRPr lang="pl-PL" altLang="en-US"/>
+                    </a:p>
+                  </a:txBody>
+                  <a:tcPr/>
+                </a:tc>
+                <a:tc>
+                  <a:txBody>
+                    <a:bodyPr/>
+                    <a:p>
+                      <a:pPr>
+                        <a:buNone/>
+                      </a:pPr>
+                      <a:r>
+                        <a:rPr lang="pl-PL" altLang="en-US"/>
+                        <a:t>4</a:t>
+                      </a:r>
+                      <a:endParaRPr lang="pl-PL" altLang="en-US"/>
+                    </a:p>
+                  </a:txBody>
+                  <a:tcPr/>
+                </a:tc>
+                <a:tc>
+                  <a:txBody>
+                    <a:bodyPr/>
+                    <a:p>
+                      <a:pPr>
+                        <a:buNone/>
+                      </a:pPr>
+                      <a:r>
+                        <a:rPr lang="pl-PL" altLang="en-US"/>
+                        <a:t>5</a:t>
+                      </a:r>
+                      <a:endParaRPr lang="pl-PL" altLang="en-US"/>
+                    </a:p>
+                  </a:txBody>
+                  <a:tcPr/>
+                </a:tc>
+              </a:tr>
+              <a:tr h="381000">
+                <a:tc>
+                  <a:txBody>
+                    <a:bodyPr/>
+                    <a:p>
+                      <a:pPr>
+                        <a:buNone/>
+                      </a:pPr>
+                      <a:r>
+                        <a:rPr lang="pl-PL" altLang="en-US"/>
+                        <a:t>wartości</a:t>
+                      </a:r>
+                      <a:endParaRPr lang="pl-PL" altLang="en-US"/>
+                    </a:p>
+                  </a:txBody>
+                  <a:tcPr/>
+                </a:tc>
+                <a:tc>
+                  <a:txBody>
+                    <a:bodyPr/>
+                    <a:p>
+                      <a:pPr>
+                        <a:buNone/>
+                      </a:pPr>
+                      <a:r>
+                        <a:rPr lang="pl-PL" altLang="en-US"/>
+                        <a:t>3</a:t>
+                      </a:r>
+                      <a:endParaRPr lang="pl-PL" altLang="en-US"/>
+                    </a:p>
+                  </a:txBody>
+                  <a:tcPr/>
+                </a:tc>
+                <a:tc>
+                  <a:txBody>
+                    <a:bodyPr/>
+                    <a:p>
+                      <a:pPr>
+                        <a:buNone/>
+                      </a:pPr>
+                      <a:r>
+                        <a:rPr lang="pl-PL" altLang="en-US"/>
+                        <a:t>1</a:t>
+                      </a:r>
+                      <a:endParaRPr lang="pl-PL" altLang="en-US"/>
+                    </a:p>
+                  </a:txBody>
+                  <a:tcPr/>
+                </a:tc>
+                <a:tc>
+                  <a:txBody>
+                    <a:bodyPr/>
+                    <a:p>
+                      <a:pPr>
+                        <a:buNone/>
+                      </a:pPr>
+                      <a:r>
+                        <a:rPr lang="pl-PL" altLang="en-US"/>
+                        <a:t>4</a:t>
+                      </a:r>
+                      <a:endParaRPr lang="pl-PL" altLang="en-US"/>
+                    </a:p>
+                  </a:txBody>
+                  <a:tcPr/>
+                </a:tc>
+                <a:tc>
+                  <a:txBody>
+                    <a:bodyPr/>
+                    <a:p>
+                      <a:pPr>
+                        <a:buNone/>
+                      </a:pPr>
+                      <a:r>
+                        <a:rPr lang="pl-PL" altLang="en-US"/>
+                        <a:t>5</a:t>
+                      </a:r>
+                      <a:endParaRPr lang="pl-PL" altLang="en-US"/>
+                    </a:p>
+                  </a:txBody>
+                  <a:tcPr/>
+                </a:tc>
+                <a:tc>
+                  <a:txBody>
+                    <a:bodyPr/>
+                    <a:p>
+                      <a:pPr>
+                        <a:buNone/>
+                      </a:pPr>
+                      <a:r>
+                        <a:rPr lang="pl-PL" altLang="en-US"/>
+                        <a:t>2</a:t>
+                      </a:r>
+                      <a:endParaRPr lang="pl-PL" altLang="en-US"/>
+                    </a:p>
+                  </a:txBody>
+                  <a:tcPr/>
+                </a:tc>
+                <a:tc>
+                  <a:txBody>
+                    <a:bodyPr/>
+                    <a:p>
+                      <a:pPr>
+                        <a:buNone/>
+                      </a:pPr>
+                      <a:r>
+                        <a:rPr lang="pl-PL" altLang="en-US"/>
+                        <a:t>7</a:t>
+                      </a:r>
+                      <a:endParaRPr lang="pl-PL" altLang="en-US"/>
+                    </a:p>
+                  </a:txBody>
+                  <a:tcPr/>
+                </a:tc>
+              </a:tr>
+            </a:tbl>
+          </a:graphicData>
+        </a:graphic>
+      </p:graphicFrame>
+      <p:graphicFrame>
+        <p:nvGraphicFramePr>
+          <p:cNvPr id="6" name="Table 5"/>
+          <p:cNvGraphicFramePr/>
+          <p:nvPr/>
+        </p:nvGraphicFramePr>
+        <p:xfrm>
+          <a:off x="1668780" y="3883660"/>
+          <a:ext cx="9704705" cy="762000"/>
+        </p:xfrm>
+        <a:graphic>
+          <a:graphicData uri="http://schemas.openxmlformats.org/drawingml/2006/table">
+            <a:tbl>
+              <a:tblPr firstRow="1" bandRow="1">
+                <a:tableStyleId>{5C22544A-7EE6-4342-B048-85BDC9FD1C3A}</a:tableStyleId>
+              </a:tblPr>
+              <a:tblGrid>
+                <a:gridCol w="1212850"/>
+                <a:gridCol w="1213485"/>
+                <a:gridCol w="1212850"/>
+                <a:gridCol w="1213485"/>
+                <a:gridCol w="1212850"/>
+                <a:gridCol w="1212850"/>
+                <a:gridCol w="1213485"/>
+                <a:gridCol w="1212850"/>
+              </a:tblGrid>
+              <a:tr h="381000">
+                <a:tc>
+                  <a:txBody>
+                    <a:bodyPr/>
+                    <a:p>
+                      <a:pPr>
+                        <a:buNone/>
+                      </a:pPr>
+                      <a:r>
+                        <a:rPr lang="pl-PL" altLang="en-US"/>
+                        <a:t>indeksy</a:t>
+                      </a:r>
+                      <a:endParaRPr lang="pl-PL" altLang="en-US"/>
+                    </a:p>
+                  </a:txBody>
+                  <a:tcPr/>
+                </a:tc>
+                <a:tc>
+                  <a:txBody>
+                    <a:bodyPr/>
+                    <a:p>
+                      <a:pPr>
+                        <a:buNone/>
+                      </a:pPr>
+                      <a:r>
+                        <a:rPr lang="pl-PL" altLang="en-US"/>
+                        <a:t>0</a:t>
+                      </a:r>
+                      <a:endParaRPr lang="pl-PL" altLang="en-US"/>
+                    </a:p>
+                  </a:txBody>
+                  <a:tcPr/>
+                </a:tc>
+                <a:tc>
+                  <a:txBody>
+                    <a:bodyPr/>
+                    <a:p>
+                      <a:pPr>
+                        <a:buNone/>
+                      </a:pPr>
+                      <a:r>
+                        <a:rPr lang="pl-PL" altLang="en-US"/>
+                        <a:t>1</a:t>
+                      </a:r>
+                      <a:endParaRPr lang="pl-PL" altLang="en-US"/>
+                    </a:p>
+                  </a:txBody>
+                  <a:tcPr/>
+                </a:tc>
+                <a:tc>
+                  <a:txBody>
+                    <a:bodyPr/>
+                    <a:p>
+                      <a:pPr>
+                        <a:buNone/>
+                      </a:pPr>
+                      <a:r>
+                        <a:rPr lang="pl-PL" altLang="en-US"/>
+                        <a:t>2</a:t>
+                      </a:r>
+                      <a:endParaRPr lang="pl-PL" altLang="en-US"/>
+                    </a:p>
+                  </a:txBody>
+                  <a:tcPr/>
+                </a:tc>
+                <a:tc>
+                  <a:txBody>
+                    <a:bodyPr/>
+                    <a:p>
+                      <a:pPr>
+                        <a:buNone/>
+                      </a:pPr>
+                      <a:r>
+                        <a:rPr lang="pl-PL" altLang="en-US"/>
+                        <a:t>3</a:t>
+                      </a:r>
+                      <a:endParaRPr lang="pl-PL" altLang="en-US"/>
+                    </a:p>
+                  </a:txBody>
+                  <a:tcPr/>
+                </a:tc>
+                <a:tc>
+                  <a:txBody>
+                    <a:bodyPr/>
+                    <a:p>
+                      <a:pPr>
+                        <a:buNone/>
+                      </a:pPr>
+                      <a:r>
+                        <a:rPr lang="pl-PL" altLang="en-US"/>
+                        <a:t>4</a:t>
+                      </a:r>
+                      <a:endParaRPr lang="pl-PL" altLang="en-US"/>
+                    </a:p>
+                  </a:txBody>
+                  <a:tcPr/>
+                </a:tc>
+                <a:tc>
+                  <a:txBody>
+                    <a:bodyPr/>
+                    <a:p>
+                      <a:pPr>
+                        <a:buNone/>
+                      </a:pPr>
+                      <a:r>
+                        <a:rPr lang="pl-PL" altLang="en-US"/>
+                        <a:t>5</a:t>
+                      </a:r>
+                      <a:endParaRPr lang="pl-PL" altLang="en-US"/>
+                    </a:p>
+                  </a:txBody>
+                  <a:tcPr/>
+                </a:tc>
+                <a:tc>
+                  <a:txBody>
+                    <a:bodyPr/>
+                    <a:p>
+                      <a:pPr>
+                        <a:buNone/>
+                      </a:pPr>
+                      <a:r>
+                        <a:rPr lang="pl-PL" altLang="en-US"/>
+                        <a:t>6</a:t>
+                      </a:r>
+                      <a:endParaRPr lang="pl-PL" altLang="en-US"/>
+                    </a:p>
+                  </a:txBody>
+                  <a:tcPr>
+                    <a:gradFill>
+                      <a:gsLst>
+                        <a:gs pos="0">
+                          <a:srgbClr val="007BD3"/>
+                        </a:gs>
+                        <a:gs pos="100000">
+                          <a:srgbClr val="034373"/>
+                        </a:gs>
+                      </a:gsLst>
+                      <a:lin ang="5400000" scaled="0"/>
+                    </a:gradFill>
+                  </a:tcPr>
+                </a:tc>
+              </a:tr>
+              <a:tr h="381000">
+                <a:tc>
+                  <a:txBody>
+                    <a:bodyPr/>
+                    <a:p>
+                      <a:pPr>
+                        <a:buNone/>
+                      </a:pPr>
+                      <a:r>
+                        <a:rPr lang="pl-PL" altLang="en-US"/>
+                        <a:t>wartości</a:t>
+                      </a:r>
+                      <a:endParaRPr lang="pl-PL" altLang="en-US"/>
+                    </a:p>
+                  </a:txBody>
+                  <a:tcPr/>
+                </a:tc>
+                <a:tc>
+                  <a:txBody>
+                    <a:bodyPr/>
+                    <a:p>
+                      <a:pPr>
+                        <a:buNone/>
+                      </a:pPr>
+                      <a:r>
+                        <a:rPr lang="pl-PL" altLang="en-US"/>
+                        <a:t>3</a:t>
+                      </a:r>
+                      <a:endParaRPr lang="pl-PL" altLang="en-US"/>
+                    </a:p>
+                  </a:txBody>
+                  <a:tcPr/>
+                </a:tc>
+                <a:tc>
+                  <a:txBody>
+                    <a:bodyPr/>
+                    <a:p>
+                      <a:pPr>
+                        <a:buNone/>
+                      </a:pPr>
+                      <a:r>
+                        <a:rPr lang="pl-PL" altLang="en-US"/>
+                        <a:t>1</a:t>
+                      </a:r>
+                      <a:endParaRPr lang="pl-PL" altLang="en-US"/>
+                    </a:p>
+                  </a:txBody>
+                  <a:tcPr/>
+                </a:tc>
+                <a:tc>
+                  <a:txBody>
+                    <a:bodyPr/>
+                    <a:p>
+                      <a:pPr>
+                        <a:buNone/>
+                      </a:pPr>
+                      <a:r>
+                        <a:rPr lang="pl-PL" altLang="en-US"/>
+                        <a:t>4</a:t>
+                      </a:r>
+                      <a:endParaRPr lang="pl-PL" altLang="en-US"/>
+                    </a:p>
+                  </a:txBody>
+                  <a:tcPr/>
+                </a:tc>
+                <a:tc>
+                  <a:txBody>
+                    <a:bodyPr/>
+                    <a:p>
+                      <a:pPr>
+                        <a:buNone/>
+                      </a:pPr>
+                      <a:r>
+                        <a:rPr lang="pl-PL" altLang="en-US"/>
+                        <a:t>5</a:t>
+                      </a:r>
+                      <a:endParaRPr lang="pl-PL" altLang="en-US"/>
+                    </a:p>
+                  </a:txBody>
+                  <a:tcPr/>
+                </a:tc>
+                <a:tc>
+                  <a:txBody>
+                    <a:bodyPr/>
+                    <a:p>
+                      <a:pPr>
+                        <a:buNone/>
+                      </a:pPr>
+                      <a:r>
+                        <a:rPr lang="pl-PL" altLang="en-US"/>
+                        <a:t>2</a:t>
+                      </a:r>
+                      <a:endParaRPr lang="pl-PL" altLang="en-US"/>
+                    </a:p>
+                  </a:txBody>
+                  <a:tcPr/>
+                </a:tc>
+                <a:tc>
+                  <a:txBody>
+                    <a:bodyPr/>
+                    <a:p>
+                      <a:pPr>
+                        <a:buNone/>
+                      </a:pPr>
+                      <a:r>
+                        <a:rPr lang="pl-PL" altLang="en-US"/>
+                        <a:t>7</a:t>
+                      </a:r>
+                      <a:endParaRPr lang="pl-PL" altLang="en-US"/>
+                    </a:p>
+                  </a:txBody>
+                  <a:tcPr/>
+                </a:tc>
+                <a:tc>
+                  <a:txBody>
+                    <a:bodyPr/>
+                    <a:p>
+                      <a:pPr>
+                        <a:buNone/>
+                      </a:pPr>
+                      <a:r>
+                        <a:rPr lang="pl-PL" altLang="en-US"/>
+                        <a:t>5</a:t>
+                      </a:r>
+                      <a:endParaRPr lang="pl-PL" altLang="en-US"/>
+                    </a:p>
+                  </a:txBody>
+                  <a:tcPr>
+                    <a:gradFill>
+                      <a:gsLst>
+                        <a:gs pos="0">
+                          <a:srgbClr val="007BD3"/>
+                        </a:gs>
+                        <a:gs pos="100000">
+                          <a:srgbClr val="034373"/>
+                        </a:gs>
+                      </a:gsLst>
+                      <a:lin ang="5400000" scaled="0"/>
+                    </a:gradFill>
+                  </a:tcPr>
+                </a:tc>
+              </a:tr>
+            </a:tbl>
+          </a:graphicData>
+        </a:graphic>
+      </p:graphicFrame>
+    </p:spTree>
+  </p:cSld>
+  <p:clrMapOvr>
+    <a:masterClrMapping/>
+  </p:clrMapOvr>
+</p:sld>
+</file>
+
+<file path=ppt/slides/slide27.xml><?xml version="1.0" encoding="utf-8"?>
 <p:sld xmlns:a="http://schemas.openxmlformats.org/drawingml/2006/main" xmlns:r="http://schemas.openxmlformats.org/officeDocument/2006/relationships" xmlns:p="http://schemas.openxmlformats.org/presentationml/2006/main">
   <p:cSld>
     <p:spTree>

</xml_diff>